<commit_message>
Update CS 25-347_Poster Rough Draft Gianni's Edits.pptx
</commit_message>
<xml_diff>
--- a/Project Deliverables/CS 25-347_Poster Rough Draft Gianni's Edits.pptx
+++ b/Project Deliverables/CS 25-347_Poster Rough Draft Gianni's Edits.pptx
@@ -3481,6 +3481,88 @@
       </p:grpSpPr>
       <p:sp>
         <p:nvSpPr>
+          <p:cNvPr id="7" name="Rectangle: Rounded Corners 6">
+            <a:extLst>
+              <a:ext uri="{FF2B5EF4-FFF2-40B4-BE49-F238E27FC236}">
+                <a16:creationId xmlns:a16="http://schemas.microsoft.com/office/drawing/2014/main" id="{968425B8-B53B-12EB-39DB-AFB939959FD1}"/>
+              </a:ext>
+            </a:extLst>
+          </p:cNvPr>
+          <p:cNvSpPr/>
+          <p:nvPr/>
+        </p:nvSpPr>
+        <p:spPr>
+          <a:xfrm>
+            <a:off x="11887199" y="18342312"/>
+            <a:ext cx="20116800" cy="9499985"/>
+          </a:xfrm>
+          <a:prstGeom prst="roundRect">
+            <a:avLst>
+              <a:gd name="adj" fmla="val 1791"/>
+            </a:avLst>
+          </a:prstGeom>
+          <a:gradFill flip="none" rotWithShape="1">
+            <a:gsLst>
+              <a:gs pos="0">
+                <a:schemeClr val="accent6">
+                  <a:lumMod val="0"/>
+                  <a:lumOff val="100000"/>
+                </a:schemeClr>
+              </a:gs>
+              <a:gs pos="35000">
+                <a:schemeClr val="accent6">
+                  <a:lumMod val="0"/>
+                  <a:lumOff val="100000"/>
+                </a:schemeClr>
+              </a:gs>
+              <a:gs pos="100000">
+                <a:schemeClr val="accent6">
+                  <a:lumMod val="100000"/>
+                </a:schemeClr>
+              </a:gs>
+            </a:gsLst>
+            <a:path path="circle">
+              <a:fillToRect l="50000" t="-80000" r="50000" b="180000"/>
+            </a:path>
+            <a:tileRect/>
+          </a:gradFill>
+          <a:effectLst/>
+        </p:spPr>
+        <p:style>
+          <a:lnRef idx="2">
+            <a:schemeClr val="accent1">
+              <a:shade val="15000"/>
+            </a:schemeClr>
+          </a:lnRef>
+          <a:fillRef idx="1">
+            <a:schemeClr val="accent1"/>
+          </a:fillRef>
+          <a:effectRef idx="0">
+            <a:schemeClr val="accent1"/>
+          </a:effectRef>
+          <a:fontRef idx="minor">
+            <a:schemeClr val="lt1"/>
+          </a:fontRef>
+        </p:style>
+        <p:txBody>
+          <a:bodyPr lIns="457200" tIns="457200" rIns="457200" bIns="457200" rtlCol="0" anchor="t" anchorCtr="0"/>
+          <a:lstStyle/>
+          <a:p>
+            <a:r>
+              <a:rPr lang="en-US" sz="4800" b="1" dirty="0">
+                <a:solidFill>
+                  <a:schemeClr val="tx1"/>
+                </a:solidFill>
+                <a:latin typeface="Arial" panose="020B0604020202020204" pitchFamily="34" charset="0"/>
+                <a:cs typeface="Arial" panose="020B0604020202020204" pitchFamily="34" charset="0"/>
+              </a:rPr>
+              <a:t>Data Flow</a:t>
+            </a:r>
+          </a:p>
+        </p:txBody>
+      </p:sp>
+      <p:sp>
+        <p:nvSpPr>
           <p:cNvPr id="5" name="Rectangle: Rounded Corners 4">
             <a:extLst>
               <a:ext uri="{FF2B5EF4-FFF2-40B4-BE49-F238E27FC236}">
@@ -3675,7 +3757,7 @@
                 <a:cs typeface="Arial" panose="020B0604020202020204" pitchFamily="34" charset="0"/>
                 <a:sym typeface="Montserrat"/>
               </a:rPr>
-              <a:t>Gianna Bautista, Ian Richards, Samuel Sarzaba, Ekta </a:t>
+              <a:t>Gianni Bautista, Ian Richards, Samuel Sarzaba, Ekta </a:t>
             </a:r>
             <a:r>
               <a:rPr lang="en-US" sz="3600" dirty="0" err="1">
@@ -4611,88 +4693,6 @@
               <a:ea typeface="Aptos" panose="020B0004020202020204" pitchFamily="34" charset="0"/>
               <a:cs typeface="Arial" panose="020B0604020202020204" pitchFamily="34" charset="0"/>
             </a:endParaRPr>
-          </a:p>
-        </p:txBody>
-      </p:sp>
-      <p:sp>
-        <p:nvSpPr>
-          <p:cNvPr id="7" name="Rectangle: Rounded Corners 6">
-            <a:extLst>
-              <a:ext uri="{FF2B5EF4-FFF2-40B4-BE49-F238E27FC236}">
-                <a16:creationId xmlns:a16="http://schemas.microsoft.com/office/drawing/2014/main" id="{968425B8-B53B-12EB-39DB-AFB939959FD1}"/>
-              </a:ext>
-            </a:extLst>
-          </p:cNvPr>
-          <p:cNvSpPr/>
-          <p:nvPr/>
-        </p:nvSpPr>
-        <p:spPr>
-          <a:xfrm>
-            <a:off x="11887199" y="18342312"/>
-            <a:ext cx="20116800" cy="9499985"/>
-          </a:xfrm>
-          <a:prstGeom prst="roundRect">
-            <a:avLst>
-              <a:gd name="adj" fmla="val 1791"/>
-            </a:avLst>
-          </a:prstGeom>
-          <a:gradFill flip="none" rotWithShape="1">
-            <a:gsLst>
-              <a:gs pos="0">
-                <a:schemeClr val="accent6">
-                  <a:lumMod val="0"/>
-                  <a:lumOff val="100000"/>
-                </a:schemeClr>
-              </a:gs>
-              <a:gs pos="35000">
-                <a:schemeClr val="accent6">
-                  <a:lumMod val="0"/>
-                  <a:lumOff val="100000"/>
-                </a:schemeClr>
-              </a:gs>
-              <a:gs pos="100000">
-                <a:schemeClr val="accent6">
-                  <a:lumMod val="100000"/>
-                </a:schemeClr>
-              </a:gs>
-            </a:gsLst>
-            <a:path path="circle">
-              <a:fillToRect l="50000" t="-80000" r="50000" b="180000"/>
-            </a:path>
-            <a:tileRect/>
-          </a:gradFill>
-          <a:effectLst/>
-        </p:spPr>
-        <p:style>
-          <a:lnRef idx="2">
-            <a:schemeClr val="accent1">
-              <a:shade val="15000"/>
-            </a:schemeClr>
-          </a:lnRef>
-          <a:fillRef idx="1">
-            <a:schemeClr val="accent1"/>
-          </a:fillRef>
-          <a:effectRef idx="0">
-            <a:schemeClr val="accent1"/>
-          </a:effectRef>
-          <a:fontRef idx="minor">
-            <a:schemeClr val="lt1"/>
-          </a:fontRef>
-        </p:style>
-        <p:txBody>
-          <a:bodyPr lIns="457200" tIns="457200" rIns="457200" bIns="457200" rtlCol="0" anchor="t" anchorCtr="0"/>
-          <a:lstStyle/>
-          <a:p>
-            <a:r>
-              <a:rPr lang="en-US" sz="4800" b="1" dirty="0">
-                <a:solidFill>
-                  <a:schemeClr val="tx1"/>
-                </a:solidFill>
-                <a:latin typeface="Arial" panose="020B0604020202020204" pitchFamily="34" charset="0"/>
-                <a:cs typeface="Arial" panose="020B0604020202020204" pitchFamily="34" charset="0"/>
-              </a:rPr>
-              <a:t>Data Flow</a:t>
-            </a:r>
           </a:p>
         </p:txBody>
       </p:sp>
@@ -4838,2238 +4838,6 @@
           </a:extLst>
         </p:spPr>
       </p:pic>
-      <p:sp>
-        <p:nvSpPr>
-          <p:cNvPr id="1058" name="TextBox 37">
-            <a:extLst>
-              <a:ext uri="{FF2B5EF4-FFF2-40B4-BE49-F238E27FC236}">
-                <a16:creationId xmlns:a16="http://schemas.microsoft.com/office/drawing/2014/main" id="{77C12DC2-E7A8-A82E-E019-E20F30D30C21}"/>
-              </a:ext>
-            </a:extLst>
-          </p:cNvPr>
-          <p:cNvSpPr txBox="1"/>
-          <p:nvPr/>
-        </p:nvSpPr>
-        <p:spPr>
-          <a:xfrm>
-            <a:off x="16366900" y="19786654"/>
-            <a:ext cx="3273230" cy="179162"/>
-          </a:xfrm>
-          <a:prstGeom prst="rect">
-            <a:avLst/>
-          </a:prstGeom>
-        </p:spPr>
-        <p:txBody>
-          <a:bodyPr lIns="0" tIns="0" rIns="0" bIns="0" rtlCol="0" anchor="t">
-            <a:spAutoFit/>
-          </a:bodyPr>
-          <a:lstStyle/>
-          <a:p>
-            <a:pPr algn="l">
-              <a:lnSpc>
-                <a:spcPts val="1299"/>
-              </a:lnSpc>
-            </a:pPr>
-            <a:endParaRPr lang="en-US" sz="1299" b="1" dirty="0">
-              <a:solidFill>
-                <a:srgbClr val="FFFFFF"/>
-              </a:solidFill>
-              <a:latin typeface="Arial" panose="020B0604020202020204" pitchFamily="34" charset="0"/>
-              <a:ea typeface="Kollektif Bold"/>
-              <a:cs typeface="Arial" panose="020B0604020202020204" pitchFamily="34" charset="0"/>
-              <a:sym typeface="Kollektif Bold"/>
-            </a:endParaRPr>
-          </a:p>
-        </p:txBody>
-      </p:sp>
-      <p:grpSp>
-        <p:nvGrpSpPr>
-          <p:cNvPr id="1079" name="Group 1078">
-            <a:extLst>
-              <a:ext uri="{FF2B5EF4-FFF2-40B4-BE49-F238E27FC236}">
-                <a16:creationId xmlns:a16="http://schemas.microsoft.com/office/drawing/2014/main" id="{2FD9058F-9DD8-748B-3E52-3EF9C3D1BCE9}"/>
-              </a:ext>
-            </a:extLst>
-          </p:cNvPr>
-          <p:cNvGrpSpPr/>
-          <p:nvPr/>
-        </p:nvGrpSpPr>
-        <p:grpSpPr>
-          <a:xfrm>
-            <a:off x="16147108" y="19021315"/>
-            <a:ext cx="13811377" cy="8548393"/>
-            <a:chOff x="15667237" y="18459635"/>
-            <a:chExt cx="13811377" cy="8548393"/>
-          </a:xfrm>
-        </p:grpSpPr>
-        <p:sp>
-          <p:nvSpPr>
-            <p:cNvPr id="1048" name="Freeform 27">
-              <a:extLst>
-                <a:ext uri="{FF2B5EF4-FFF2-40B4-BE49-F238E27FC236}">
-                  <a16:creationId xmlns:a16="http://schemas.microsoft.com/office/drawing/2014/main" id="{F95F2192-0C65-CB31-28DE-7DA4AFE65861}"/>
-                </a:ext>
-              </a:extLst>
-            </p:cNvPr>
-            <p:cNvSpPr/>
-            <p:nvPr/>
-          </p:nvSpPr>
-          <p:spPr>
-            <a:xfrm rot="5400000">
-              <a:off x="18105712" y="22767785"/>
-              <a:ext cx="1582690" cy="1582690"/>
-            </a:xfrm>
-            <a:custGeom>
-              <a:avLst/>
-              <a:gdLst/>
-              <a:ahLst/>
-              <a:cxnLst/>
-              <a:rect l="l" t="t" r="r" b="b"/>
-              <a:pathLst>
-                <a:path w="827978" h="827978">
-                  <a:moveTo>
-                    <a:pt x="0" y="0"/>
-                  </a:moveTo>
-                  <a:lnTo>
-                    <a:pt x="827978" y="0"/>
-                  </a:lnTo>
-                  <a:lnTo>
-                    <a:pt x="827978" y="827978"/>
-                  </a:lnTo>
-                  <a:lnTo>
-                    <a:pt x="0" y="827978"/>
-                  </a:lnTo>
-                  <a:lnTo>
-                    <a:pt x="0" y="0"/>
-                  </a:lnTo>
-                  <a:close/>
-                </a:path>
-              </a:pathLst>
-            </a:custGeom>
-            <a:blipFill>
-              <a:blip r:embed="rId8">
-                <a:extLst>
-                  <a:ext uri="{96DAC541-7B7A-43D3-8B79-37D633B846F1}">
-                    <asvg:svgBlip xmlns:asvg="http://schemas.microsoft.com/office/drawing/2016/SVG/main" r:embed="rId9"/>
-                  </a:ext>
-                </a:extLst>
-              </a:blip>
-              <a:stretch>
-                <a:fillRect/>
-              </a:stretch>
-            </a:blipFill>
-          </p:spPr>
-          <p:txBody>
-            <a:bodyPr/>
-            <a:lstStyle/>
-            <a:p>
-              <a:endParaRPr lang="en-US"/>
-            </a:p>
-          </p:txBody>
-        </p:sp>
-        <p:grpSp>
-          <p:nvGrpSpPr>
-            <p:cNvPr id="1078" name="Group 1077">
-              <a:extLst>
-                <a:ext uri="{FF2B5EF4-FFF2-40B4-BE49-F238E27FC236}">
-                  <a16:creationId xmlns:a16="http://schemas.microsoft.com/office/drawing/2014/main" id="{427D9194-A77B-2E00-A02F-6E3096882264}"/>
-                </a:ext>
-              </a:extLst>
-            </p:cNvPr>
-            <p:cNvGrpSpPr/>
-            <p:nvPr/>
-          </p:nvGrpSpPr>
-          <p:grpSpPr>
-            <a:xfrm>
-              <a:off x="15667237" y="18459635"/>
-              <a:ext cx="13811377" cy="8548393"/>
-              <a:chOff x="15667237" y="18459635"/>
-              <a:chExt cx="13811377" cy="8548393"/>
-            </a:xfrm>
-          </p:grpSpPr>
-          <p:grpSp>
-            <p:nvGrpSpPr>
-              <p:cNvPr id="59" name="Group 2">
-                <a:extLst>
-                  <a:ext uri="{FF2B5EF4-FFF2-40B4-BE49-F238E27FC236}">
-                    <a16:creationId xmlns:a16="http://schemas.microsoft.com/office/drawing/2014/main" id="{DA29C6E6-C29B-ADBB-866B-820F06BD13AD}"/>
-                  </a:ext>
-                </a:extLst>
-              </p:cNvPr>
-              <p:cNvGrpSpPr/>
-              <p:nvPr/>
-            </p:nvGrpSpPr>
-            <p:grpSpPr>
-              <a:xfrm>
-                <a:off x="15667237" y="18843854"/>
-                <a:ext cx="7230684" cy="1867190"/>
-                <a:chOff x="0" y="0"/>
-                <a:chExt cx="8950884" cy="2311400"/>
-              </a:xfrm>
-            </p:grpSpPr>
-            <p:sp>
-              <p:nvSpPr>
-                <p:cNvPr id="60" name="Freeform 3">
-                  <a:extLst>
-                    <a:ext uri="{FF2B5EF4-FFF2-40B4-BE49-F238E27FC236}">
-                      <a16:creationId xmlns:a16="http://schemas.microsoft.com/office/drawing/2014/main" id="{540C618B-DC44-3237-DF62-192008FA0710}"/>
-                    </a:ext>
-                  </a:extLst>
-                </p:cNvPr>
-                <p:cNvSpPr/>
-                <p:nvPr/>
-              </p:nvSpPr>
-              <p:spPr>
-                <a:xfrm>
-                  <a:off x="0" y="0"/>
-                  <a:ext cx="8950884" cy="2311400"/>
-                </a:xfrm>
-                <a:custGeom>
-                  <a:avLst/>
-                  <a:gdLst/>
-                  <a:ahLst/>
-                  <a:cxnLst/>
-                  <a:rect l="l" t="t" r="r" b="b"/>
-                  <a:pathLst>
-                    <a:path w="8950884" h="2311400">
-                      <a:moveTo>
-                        <a:pt x="8646084" y="0"/>
-                      </a:moveTo>
-                      <a:lnTo>
-                        <a:pt x="304800" y="0"/>
-                      </a:lnTo>
-                      <a:cubicBezTo>
-                        <a:pt x="135890" y="0"/>
-                        <a:pt x="0" y="135890"/>
-                        <a:pt x="0" y="304800"/>
-                      </a:cubicBezTo>
-                      <a:lnTo>
-                        <a:pt x="0" y="2006600"/>
-                      </a:lnTo>
-                      <a:cubicBezTo>
-                        <a:pt x="0" y="2175510"/>
-                        <a:pt x="135890" y="2311400"/>
-                        <a:pt x="304800" y="2311400"/>
-                      </a:cubicBezTo>
-                      <a:lnTo>
-                        <a:pt x="8646084" y="2311400"/>
-                      </a:lnTo>
-                      <a:cubicBezTo>
-                        <a:pt x="8814994" y="2311400"/>
-                        <a:pt x="8950884" y="2175510"/>
-                        <a:pt x="8950884" y="2006600"/>
-                      </a:cubicBezTo>
-                      <a:lnTo>
-                        <a:pt x="8950884" y="304800"/>
-                      </a:lnTo>
-                      <a:cubicBezTo>
-                        <a:pt x="8950884" y="135890"/>
-                        <a:pt x="8814994" y="0"/>
-                        <a:pt x="8646084" y="0"/>
-                      </a:cubicBezTo>
-                      <a:close/>
-                    </a:path>
-                  </a:pathLst>
-                </a:custGeom>
-                <a:solidFill>
-                  <a:srgbClr val="AAC6E7"/>
-                </a:solidFill>
-              </p:spPr>
-              <p:txBody>
-                <a:bodyPr/>
-                <a:lstStyle/>
-                <a:p>
-                  <a:endParaRPr lang="en-US" dirty="0"/>
-                </a:p>
-              </p:txBody>
-            </p:sp>
-          </p:grpSp>
-          <p:grpSp>
-            <p:nvGrpSpPr>
-              <p:cNvPr id="61" name="Group 4">
-                <a:extLst>
-                  <a:ext uri="{FF2B5EF4-FFF2-40B4-BE49-F238E27FC236}">
-                    <a16:creationId xmlns:a16="http://schemas.microsoft.com/office/drawing/2014/main" id="{0C6F2EF7-C7F6-CEB1-6DAD-3F9DA8C0E498}"/>
-                  </a:ext>
-                </a:extLst>
-              </p:cNvPr>
-              <p:cNvGrpSpPr/>
-              <p:nvPr/>
-            </p:nvGrpSpPr>
-            <p:grpSpPr>
-              <a:xfrm>
-                <a:off x="17685606" y="20953628"/>
-                <a:ext cx="7230684" cy="1867190"/>
-                <a:chOff x="0" y="0"/>
-                <a:chExt cx="8950884" cy="2311400"/>
-              </a:xfrm>
-            </p:grpSpPr>
-            <p:sp>
-              <p:nvSpPr>
-                <p:cNvPr id="62" name="Freeform 5">
-                  <a:extLst>
-                    <a:ext uri="{FF2B5EF4-FFF2-40B4-BE49-F238E27FC236}">
-                      <a16:creationId xmlns:a16="http://schemas.microsoft.com/office/drawing/2014/main" id="{CFFA1CC9-5E84-4908-9BE0-80B3B6D331FF}"/>
-                    </a:ext>
-                  </a:extLst>
-                </p:cNvPr>
-                <p:cNvSpPr/>
-                <p:nvPr/>
-              </p:nvSpPr>
-              <p:spPr>
-                <a:xfrm>
-                  <a:off x="0" y="0"/>
-                  <a:ext cx="8950884" cy="2311400"/>
-                </a:xfrm>
-                <a:custGeom>
-                  <a:avLst/>
-                  <a:gdLst/>
-                  <a:ahLst/>
-                  <a:cxnLst/>
-                  <a:rect l="l" t="t" r="r" b="b"/>
-                  <a:pathLst>
-                    <a:path w="8950884" h="2311400">
-                      <a:moveTo>
-                        <a:pt x="8646084" y="0"/>
-                      </a:moveTo>
-                      <a:lnTo>
-                        <a:pt x="304800" y="0"/>
-                      </a:lnTo>
-                      <a:cubicBezTo>
-                        <a:pt x="135890" y="0"/>
-                        <a:pt x="0" y="135890"/>
-                        <a:pt x="0" y="304800"/>
-                      </a:cubicBezTo>
-                      <a:lnTo>
-                        <a:pt x="0" y="2006600"/>
-                      </a:lnTo>
-                      <a:cubicBezTo>
-                        <a:pt x="0" y="2175510"/>
-                        <a:pt x="135890" y="2311400"/>
-                        <a:pt x="304800" y="2311400"/>
-                      </a:cubicBezTo>
-                      <a:lnTo>
-                        <a:pt x="8646084" y="2311400"/>
-                      </a:lnTo>
-                      <a:cubicBezTo>
-                        <a:pt x="8814994" y="2311400"/>
-                        <a:pt x="8950884" y="2175510"/>
-                        <a:pt x="8950884" y="2006600"/>
-                      </a:cubicBezTo>
-                      <a:lnTo>
-                        <a:pt x="8950884" y="304800"/>
-                      </a:lnTo>
-                      <a:cubicBezTo>
-                        <a:pt x="8950884" y="135890"/>
-                        <a:pt x="8814994" y="0"/>
-                        <a:pt x="8646084" y="0"/>
-                      </a:cubicBezTo>
-                      <a:close/>
-                    </a:path>
-                  </a:pathLst>
-                </a:custGeom>
-                <a:solidFill>
-                  <a:srgbClr val="A7DEC1"/>
-                </a:solidFill>
-              </p:spPr>
-              <p:txBody>
-                <a:bodyPr/>
-                <a:lstStyle/>
-                <a:p>
-                  <a:endParaRPr lang="en-US"/>
-                </a:p>
-              </p:txBody>
-            </p:sp>
-          </p:grpSp>
-          <p:grpSp>
-            <p:nvGrpSpPr>
-              <p:cNvPr id="63" name="Group 6">
-                <a:extLst>
-                  <a:ext uri="{FF2B5EF4-FFF2-40B4-BE49-F238E27FC236}">
-                    <a16:creationId xmlns:a16="http://schemas.microsoft.com/office/drawing/2014/main" id="{EDD74026-035A-F550-44BC-A58A05457FD7}"/>
-                  </a:ext>
-                </a:extLst>
-              </p:cNvPr>
-              <p:cNvGrpSpPr/>
-              <p:nvPr/>
-            </p:nvGrpSpPr>
-            <p:grpSpPr>
-              <a:xfrm>
-                <a:off x="19688402" y="23072641"/>
-                <a:ext cx="7230684" cy="1867190"/>
-                <a:chOff x="0" y="0"/>
-                <a:chExt cx="8950884" cy="2311400"/>
-              </a:xfrm>
-            </p:grpSpPr>
-            <p:sp>
-              <p:nvSpPr>
-                <p:cNvPr id="1024" name="Freeform 7">
-                  <a:extLst>
-                    <a:ext uri="{FF2B5EF4-FFF2-40B4-BE49-F238E27FC236}">
-                      <a16:creationId xmlns:a16="http://schemas.microsoft.com/office/drawing/2014/main" id="{C9973BC2-C79D-88F5-EEC2-C921AC0E52E7}"/>
-                    </a:ext>
-                  </a:extLst>
-                </p:cNvPr>
-                <p:cNvSpPr/>
-                <p:nvPr/>
-              </p:nvSpPr>
-              <p:spPr>
-                <a:xfrm>
-                  <a:off x="0" y="0"/>
-                  <a:ext cx="8950884" cy="2311400"/>
-                </a:xfrm>
-                <a:custGeom>
-                  <a:avLst/>
-                  <a:gdLst/>
-                  <a:ahLst/>
-                  <a:cxnLst/>
-                  <a:rect l="l" t="t" r="r" b="b"/>
-                  <a:pathLst>
-                    <a:path w="8950884" h="2311400">
-                      <a:moveTo>
-                        <a:pt x="8646084" y="0"/>
-                      </a:moveTo>
-                      <a:lnTo>
-                        <a:pt x="304800" y="0"/>
-                      </a:lnTo>
-                      <a:cubicBezTo>
-                        <a:pt x="135890" y="0"/>
-                        <a:pt x="0" y="135890"/>
-                        <a:pt x="0" y="304800"/>
-                      </a:cubicBezTo>
-                      <a:lnTo>
-                        <a:pt x="0" y="2006600"/>
-                      </a:lnTo>
-                      <a:cubicBezTo>
-                        <a:pt x="0" y="2175510"/>
-                        <a:pt x="135890" y="2311400"/>
-                        <a:pt x="304800" y="2311400"/>
-                      </a:cubicBezTo>
-                      <a:lnTo>
-                        <a:pt x="8646084" y="2311400"/>
-                      </a:lnTo>
-                      <a:cubicBezTo>
-                        <a:pt x="8814994" y="2311400"/>
-                        <a:pt x="8950884" y="2175510"/>
-                        <a:pt x="8950884" y="2006600"/>
-                      </a:cubicBezTo>
-                      <a:lnTo>
-                        <a:pt x="8950884" y="304800"/>
-                      </a:lnTo>
-                      <a:cubicBezTo>
-                        <a:pt x="8950884" y="135890"/>
-                        <a:pt x="8814994" y="0"/>
-                        <a:pt x="8646084" y="0"/>
-                      </a:cubicBezTo>
-                      <a:close/>
-                    </a:path>
-                  </a:pathLst>
-                </a:custGeom>
-                <a:solidFill>
-                  <a:srgbClr val="76B900"/>
-                </a:solidFill>
-              </p:spPr>
-              <p:txBody>
-                <a:bodyPr/>
-                <a:lstStyle/>
-                <a:p>
-                  <a:endParaRPr lang="en-US"/>
-                </a:p>
-              </p:txBody>
-            </p:sp>
-          </p:grpSp>
-          <p:grpSp>
-            <p:nvGrpSpPr>
-              <p:cNvPr id="1025" name="Group 8">
-                <a:extLst>
-                  <a:ext uri="{FF2B5EF4-FFF2-40B4-BE49-F238E27FC236}">
-                    <a16:creationId xmlns:a16="http://schemas.microsoft.com/office/drawing/2014/main" id="{B3DEEC59-03A2-0149-9DE3-27C82557804D}"/>
-                  </a:ext>
-                </a:extLst>
-              </p:cNvPr>
-              <p:cNvGrpSpPr/>
-              <p:nvPr/>
-            </p:nvGrpSpPr>
-            <p:grpSpPr>
-              <a:xfrm>
-                <a:off x="21673489" y="25140838"/>
-                <a:ext cx="7230684" cy="1867190"/>
-                <a:chOff x="0" y="0"/>
-                <a:chExt cx="8950884" cy="2311400"/>
-              </a:xfrm>
-            </p:grpSpPr>
-            <p:sp>
-              <p:nvSpPr>
-                <p:cNvPr id="1027" name="Freeform 9">
-                  <a:extLst>
-                    <a:ext uri="{FF2B5EF4-FFF2-40B4-BE49-F238E27FC236}">
-                      <a16:creationId xmlns:a16="http://schemas.microsoft.com/office/drawing/2014/main" id="{FE1CE24F-E416-9EE0-1221-695F409B8F8C}"/>
-                    </a:ext>
-                  </a:extLst>
-                </p:cNvPr>
-                <p:cNvSpPr/>
-                <p:nvPr/>
-              </p:nvSpPr>
-              <p:spPr>
-                <a:xfrm>
-                  <a:off x="0" y="0"/>
-                  <a:ext cx="8950884" cy="2311400"/>
-                </a:xfrm>
-                <a:custGeom>
-                  <a:avLst/>
-                  <a:gdLst/>
-                  <a:ahLst/>
-                  <a:cxnLst/>
-                  <a:rect l="l" t="t" r="r" b="b"/>
-                  <a:pathLst>
-                    <a:path w="8950884" h="2311400">
-                      <a:moveTo>
-                        <a:pt x="8646084" y="0"/>
-                      </a:moveTo>
-                      <a:lnTo>
-                        <a:pt x="304800" y="0"/>
-                      </a:lnTo>
-                      <a:cubicBezTo>
-                        <a:pt x="135890" y="0"/>
-                        <a:pt x="0" y="135890"/>
-                        <a:pt x="0" y="304800"/>
-                      </a:cubicBezTo>
-                      <a:lnTo>
-                        <a:pt x="0" y="2006600"/>
-                      </a:lnTo>
-                      <a:cubicBezTo>
-                        <a:pt x="0" y="2175510"/>
-                        <a:pt x="135890" y="2311400"/>
-                        <a:pt x="304800" y="2311400"/>
-                      </a:cubicBezTo>
-                      <a:lnTo>
-                        <a:pt x="8646084" y="2311400"/>
-                      </a:lnTo>
-                      <a:cubicBezTo>
-                        <a:pt x="8814994" y="2311400"/>
-                        <a:pt x="8950884" y="2175510"/>
-                        <a:pt x="8950884" y="2006600"/>
-                      </a:cubicBezTo>
-                      <a:lnTo>
-                        <a:pt x="8950884" y="304800"/>
-                      </a:lnTo>
-                      <a:cubicBezTo>
-                        <a:pt x="8950884" y="135890"/>
-                        <a:pt x="8814994" y="0"/>
-                        <a:pt x="8646084" y="0"/>
-                      </a:cubicBezTo>
-                      <a:close/>
-                    </a:path>
-                  </a:pathLst>
-                </a:custGeom>
-                <a:solidFill>
-                  <a:srgbClr val="AAC6E7"/>
-                </a:solidFill>
-              </p:spPr>
-              <p:txBody>
-                <a:bodyPr/>
-                <a:lstStyle/>
-                <a:p>
-                  <a:endParaRPr lang="en-US"/>
-                </a:p>
-              </p:txBody>
-            </p:sp>
-          </p:grpSp>
-          <p:sp>
-            <p:nvSpPr>
-              <p:cNvPr id="1047" name="Freeform 26">
-                <a:extLst>
-                  <a:ext uri="{FF2B5EF4-FFF2-40B4-BE49-F238E27FC236}">
-                    <a16:creationId xmlns:a16="http://schemas.microsoft.com/office/drawing/2014/main" id="{FD055EF9-98B6-9059-036A-362418B72F31}"/>
-                  </a:ext>
-                </a:extLst>
-              </p:cNvPr>
-              <p:cNvSpPr/>
-              <p:nvPr/>
-            </p:nvSpPr>
-            <p:spPr>
-              <a:xfrm rot="5400000">
-                <a:off x="16111799" y="20698393"/>
-                <a:ext cx="1582690" cy="1582690"/>
-              </a:xfrm>
-              <a:custGeom>
-                <a:avLst/>
-                <a:gdLst/>
-                <a:ahLst/>
-                <a:cxnLst/>
-                <a:rect l="l" t="t" r="r" b="b"/>
-                <a:pathLst>
-                  <a:path w="827978" h="827978">
-                    <a:moveTo>
-                      <a:pt x="0" y="0"/>
-                    </a:moveTo>
-                    <a:lnTo>
-                      <a:pt x="827978" y="0"/>
-                    </a:lnTo>
-                    <a:lnTo>
-                      <a:pt x="827978" y="827978"/>
-                    </a:lnTo>
-                    <a:lnTo>
-                      <a:pt x="0" y="827978"/>
-                    </a:lnTo>
-                    <a:lnTo>
-                      <a:pt x="0" y="0"/>
-                    </a:lnTo>
-                    <a:close/>
-                  </a:path>
-                </a:pathLst>
-              </a:custGeom>
-              <a:blipFill>
-                <a:blip r:embed="rId10">
-                  <a:extLst>
-                    <a:ext uri="{96DAC541-7B7A-43D3-8B79-37D633B846F1}">
-                      <asvg:svgBlip xmlns:asvg="http://schemas.microsoft.com/office/drawing/2016/SVG/main" r:embed="rId11"/>
-                    </a:ext>
-                  </a:extLst>
-                </a:blip>
-                <a:stretch>
-                  <a:fillRect/>
-                </a:stretch>
-              </a:blipFill>
-            </p:spPr>
-            <p:txBody>
-              <a:bodyPr/>
-              <a:lstStyle/>
-              <a:p>
-                <a:endParaRPr lang="en-US"/>
-              </a:p>
-            </p:txBody>
-          </p:sp>
-          <p:sp>
-            <p:nvSpPr>
-              <p:cNvPr id="1049" name="Freeform 28">
-                <a:extLst>
-                  <a:ext uri="{FF2B5EF4-FFF2-40B4-BE49-F238E27FC236}">
-                    <a16:creationId xmlns:a16="http://schemas.microsoft.com/office/drawing/2014/main" id="{995F1149-08A2-2117-1AFA-EFE39556822D}"/>
-                  </a:ext>
-                </a:extLst>
-              </p:cNvPr>
-              <p:cNvSpPr/>
-              <p:nvPr/>
-            </p:nvSpPr>
-            <p:spPr>
-              <a:xfrm rot="5400000">
-                <a:off x="20091776" y="24934111"/>
-                <a:ext cx="1582690" cy="1582690"/>
-              </a:xfrm>
-              <a:custGeom>
-                <a:avLst/>
-                <a:gdLst/>
-                <a:ahLst/>
-                <a:cxnLst/>
-                <a:rect l="l" t="t" r="r" b="b"/>
-                <a:pathLst>
-                  <a:path w="827978" h="827978">
-                    <a:moveTo>
-                      <a:pt x="0" y="0"/>
-                    </a:moveTo>
-                    <a:lnTo>
-                      <a:pt x="827978" y="0"/>
-                    </a:lnTo>
-                    <a:lnTo>
-                      <a:pt x="827978" y="827978"/>
-                    </a:lnTo>
-                    <a:lnTo>
-                      <a:pt x="0" y="827978"/>
-                    </a:lnTo>
-                    <a:lnTo>
-                      <a:pt x="0" y="0"/>
-                    </a:lnTo>
-                    <a:close/>
-                  </a:path>
-                </a:pathLst>
-              </a:custGeom>
-              <a:blipFill>
-                <a:blip r:embed="rId12">
-                  <a:extLst>
-                    <a:ext uri="{96DAC541-7B7A-43D3-8B79-37D633B846F1}">
-                      <asvg:svgBlip xmlns:asvg="http://schemas.microsoft.com/office/drawing/2016/SVG/main" r:embed="rId13"/>
-                    </a:ext>
-                  </a:extLst>
-                </a:blip>
-                <a:stretch>
-                  <a:fillRect/>
-                </a:stretch>
-              </a:blipFill>
-            </p:spPr>
-            <p:txBody>
-              <a:bodyPr/>
-              <a:lstStyle/>
-              <a:p>
-                <a:endParaRPr lang="en-US"/>
-              </a:p>
-            </p:txBody>
-          </p:sp>
-          <p:grpSp>
-            <p:nvGrpSpPr>
-              <p:cNvPr id="1068" name="Group 1067">
-                <a:extLst>
-                  <a:ext uri="{FF2B5EF4-FFF2-40B4-BE49-F238E27FC236}">
-                    <a16:creationId xmlns:a16="http://schemas.microsoft.com/office/drawing/2014/main" id="{36648536-95B5-2429-EE09-1EF372546140}"/>
-                  </a:ext>
-                </a:extLst>
-              </p:cNvPr>
-              <p:cNvGrpSpPr/>
-              <p:nvPr/>
-            </p:nvGrpSpPr>
-            <p:grpSpPr>
-              <a:xfrm>
-                <a:off x="22251553" y="18459635"/>
-                <a:ext cx="1292735" cy="1292735"/>
-                <a:chOff x="22258183" y="18537231"/>
-                <a:chExt cx="1292735" cy="1292735"/>
-              </a:xfrm>
-            </p:grpSpPr>
-            <p:grpSp>
-              <p:nvGrpSpPr>
-                <p:cNvPr id="1029" name="Group 10">
-                  <a:extLst>
-                    <a:ext uri="{FF2B5EF4-FFF2-40B4-BE49-F238E27FC236}">
-                      <a16:creationId xmlns:a16="http://schemas.microsoft.com/office/drawing/2014/main" id="{669F360E-A2CB-A792-D144-8F818A13FDE4}"/>
-                    </a:ext>
-                  </a:extLst>
-                </p:cNvPr>
-                <p:cNvGrpSpPr/>
-                <p:nvPr/>
-              </p:nvGrpSpPr>
-              <p:grpSpPr>
-                <a:xfrm>
-                  <a:off x="22258183" y="18537231"/>
-                  <a:ext cx="1292735" cy="1292735"/>
-                  <a:chOff x="0" y="0"/>
-                  <a:chExt cx="6350000" cy="6350000"/>
-                </a:xfrm>
-              </p:grpSpPr>
-              <p:sp>
-                <p:nvSpPr>
-                  <p:cNvPr id="1031" name="Freeform 11">
-                    <a:extLst>
-                      <a:ext uri="{FF2B5EF4-FFF2-40B4-BE49-F238E27FC236}">
-                        <a16:creationId xmlns:a16="http://schemas.microsoft.com/office/drawing/2014/main" id="{D2918351-750D-781E-CF14-FDE18FA113C5}"/>
-                      </a:ext>
-                    </a:extLst>
-                  </p:cNvPr>
-                  <p:cNvSpPr/>
-                  <p:nvPr/>
-                </p:nvSpPr>
-                <p:spPr>
-                  <a:xfrm>
-                    <a:off x="0" y="0"/>
-                    <a:ext cx="6350000" cy="6350000"/>
-                  </a:xfrm>
-                  <a:custGeom>
-                    <a:avLst/>
-                    <a:gdLst/>
-                    <a:ahLst/>
-                    <a:cxnLst/>
-                    <a:rect l="l" t="t" r="r" b="b"/>
-                    <a:pathLst>
-                      <a:path w="6350000" h="6350000">
-                        <a:moveTo>
-                          <a:pt x="3175000" y="0"/>
-                        </a:moveTo>
-                        <a:cubicBezTo>
-                          <a:pt x="1421496" y="0"/>
-                          <a:pt x="0" y="1421496"/>
-                          <a:pt x="0" y="3175000"/>
-                        </a:cubicBezTo>
-                        <a:cubicBezTo>
-                          <a:pt x="0" y="4928504"/>
-                          <a:pt x="1421496" y="6350000"/>
-                          <a:pt x="3175000" y="6350000"/>
-                        </a:cubicBezTo>
-                        <a:cubicBezTo>
-                          <a:pt x="4928504" y="6350000"/>
-                          <a:pt x="6350000" y="4928504"/>
-                          <a:pt x="6350000" y="3175000"/>
-                        </a:cubicBezTo>
-                        <a:cubicBezTo>
-                          <a:pt x="6350000" y="1421496"/>
-                          <a:pt x="4928504" y="0"/>
-                          <a:pt x="3175000" y="0"/>
-                        </a:cubicBezTo>
-                        <a:close/>
-                      </a:path>
-                    </a:pathLst>
-                  </a:custGeom>
-                  <a:solidFill>
-                    <a:srgbClr val="AAC6E7"/>
-                  </a:solidFill>
-                </p:spPr>
-                <p:txBody>
-                  <a:bodyPr/>
-                  <a:lstStyle/>
-                  <a:p>
-                    <a:endParaRPr lang="en-US"/>
-                  </a:p>
-                </p:txBody>
-              </p:sp>
-            </p:grpSp>
-            <p:grpSp>
-              <p:nvGrpSpPr>
-                <p:cNvPr id="1039" name="Group 18">
-                  <a:extLst>
-                    <a:ext uri="{FF2B5EF4-FFF2-40B4-BE49-F238E27FC236}">
-                      <a16:creationId xmlns:a16="http://schemas.microsoft.com/office/drawing/2014/main" id="{1FCCD966-246E-7B32-59D7-2B070C4070F1}"/>
-                    </a:ext>
-                  </a:extLst>
-                </p:cNvPr>
-                <p:cNvGrpSpPr/>
-                <p:nvPr/>
-              </p:nvGrpSpPr>
-              <p:grpSpPr>
-                <a:xfrm>
-                  <a:off x="22436740" y="18700031"/>
-                  <a:ext cx="967135" cy="967135"/>
-                  <a:chOff x="7" y="7"/>
-                  <a:chExt cx="6350000" cy="6350000"/>
-                </a:xfrm>
-              </p:grpSpPr>
-              <p:sp>
-                <p:nvSpPr>
-                  <p:cNvPr id="1040" name="Freeform 19">
-                    <a:extLst>
-                      <a:ext uri="{FF2B5EF4-FFF2-40B4-BE49-F238E27FC236}">
-                        <a16:creationId xmlns:a16="http://schemas.microsoft.com/office/drawing/2014/main" id="{59F1985F-88BD-DBB0-C094-16583BD9C9C8}"/>
-                      </a:ext>
-                    </a:extLst>
-                  </p:cNvPr>
-                  <p:cNvSpPr/>
-                  <p:nvPr/>
-                </p:nvSpPr>
-                <p:spPr>
-                  <a:xfrm>
-                    <a:off x="7" y="7"/>
-                    <a:ext cx="6350000" cy="6350000"/>
-                  </a:xfrm>
-                  <a:custGeom>
-                    <a:avLst/>
-                    <a:gdLst/>
-                    <a:ahLst/>
-                    <a:cxnLst/>
-                    <a:rect l="l" t="t" r="r" b="b"/>
-                    <a:pathLst>
-                      <a:path w="6350000" h="6350000">
-                        <a:moveTo>
-                          <a:pt x="3175000" y="0"/>
-                        </a:moveTo>
-                        <a:cubicBezTo>
-                          <a:pt x="1421496" y="0"/>
-                          <a:pt x="0" y="1421496"/>
-                          <a:pt x="0" y="3175000"/>
-                        </a:cubicBezTo>
-                        <a:cubicBezTo>
-                          <a:pt x="0" y="4928504"/>
-                          <a:pt x="1421496" y="6350000"/>
-                          <a:pt x="3175000" y="6350000"/>
-                        </a:cubicBezTo>
-                        <a:cubicBezTo>
-                          <a:pt x="4928504" y="6350000"/>
-                          <a:pt x="6350000" y="4928504"/>
-                          <a:pt x="6350000" y="3175000"/>
-                        </a:cubicBezTo>
-                        <a:cubicBezTo>
-                          <a:pt x="6350000" y="1421496"/>
-                          <a:pt x="4928504" y="0"/>
-                          <a:pt x="3175000" y="0"/>
-                        </a:cubicBezTo>
-                        <a:close/>
-                      </a:path>
-                    </a:pathLst>
-                  </a:custGeom>
-                  <a:solidFill>
-                    <a:srgbClr val="FFFFFF"/>
-                  </a:solidFill>
-                </p:spPr>
-                <p:txBody>
-                  <a:bodyPr/>
-                  <a:lstStyle/>
-                  <a:p>
-                    <a:endParaRPr lang="en-US"/>
-                  </a:p>
-                </p:txBody>
-              </p:sp>
-            </p:grpSp>
-            <p:sp>
-              <p:nvSpPr>
-                <p:cNvPr id="1050" name="Freeform 29">
-                  <a:extLst>
-                    <a:ext uri="{FF2B5EF4-FFF2-40B4-BE49-F238E27FC236}">
-                      <a16:creationId xmlns:a16="http://schemas.microsoft.com/office/drawing/2014/main" id="{6F57AE17-D554-927A-50DE-29F54511C830}"/>
-                    </a:ext>
-                  </a:extLst>
-                </p:cNvPr>
-                <p:cNvSpPr/>
-                <p:nvPr/>
-              </p:nvSpPr>
-              <p:spPr>
-                <a:xfrm>
-                  <a:off x="22772580" y="18814888"/>
-                  <a:ext cx="338015" cy="730842"/>
-                </a:xfrm>
-                <a:custGeom>
-                  <a:avLst/>
-                  <a:gdLst/>
-                  <a:ahLst/>
-                  <a:cxnLst/>
-                  <a:rect l="l" t="t" r="r" b="b"/>
-                  <a:pathLst>
-                    <a:path w="176831" h="382337">
-                      <a:moveTo>
-                        <a:pt x="0" y="0"/>
-                      </a:moveTo>
-                      <a:lnTo>
-                        <a:pt x="176830" y="0"/>
-                      </a:lnTo>
-                      <a:lnTo>
-                        <a:pt x="176830" y="382337"/>
-                      </a:lnTo>
-                      <a:lnTo>
-                        <a:pt x="0" y="382337"/>
-                      </a:lnTo>
-                      <a:lnTo>
-                        <a:pt x="0" y="0"/>
-                      </a:lnTo>
-                      <a:close/>
-                    </a:path>
-                  </a:pathLst>
-                </a:custGeom>
-                <a:blipFill>
-                  <a:blip r:embed="rId14">
-                    <a:extLst>
-                      <a:ext uri="{96DAC541-7B7A-43D3-8B79-37D633B846F1}">
-                        <asvg:svgBlip xmlns:asvg="http://schemas.microsoft.com/office/drawing/2016/SVG/main" r:embed="rId15"/>
-                      </a:ext>
-                    </a:extLst>
-                  </a:blip>
-                  <a:stretch>
-                    <a:fillRect/>
-                  </a:stretch>
-                </a:blipFill>
-              </p:spPr>
-              <p:txBody>
-                <a:bodyPr/>
-                <a:lstStyle/>
-                <a:p>
-                  <a:endParaRPr lang="en-US"/>
-                </a:p>
-              </p:txBody>
-            </p:sp>
-          </p:grpSp>
-          <p:grpSp>
-            <p:nvGrpSpPr>
-              <p:cNvPr id="1067" name="Group 1066">
-                <a:extLst>
-                  <a:ext uri="{FF2B5EF4-FFF2-40B4-BE49-F238E27FC236}">
-                    <a16:creationId xmlns:a16="http://schemas.microsoft.com/office/drawing/2014/main" id="{2C568337-A8CB-E581-62E8-4EF90B63E3FC}"/>
-                  </a:ext>
-                </a:extLst>
-              </p:cNvPr>
-              <p:cNvGrpSpPr/>
-              <p:nvPr/>
-            </p:nvGrpSpPr>
-            <p:grpSpPr>
-              <a:xfrm>
-                <a:off x="24251716" y="20526735"/>
-                <a:ext cx="1292735" cy="1292735"/>
-                <a:chOff x="24251716" y="20586369"/>
-                <a:chExt cx="1292735" cy="1292735"/>
-              </a:xfrm>
-            </p:grpSpPr>
-            <p:grpSp>
-              <p:nvGrpSpPr>
-                <p:cNvPr id="1032" name="Group 12">
-                  <a:extLst>
-                    <a:ext uri="{FF2B5EF4-FFF2-40B4-BE49-F238E27FC236}">
-                      <a16:creationId xmlns:a16="http://schemas.microsoft.com/office/drawing/2014/main" id="{3B0DB109-BE8C-044C-4DAB-91E9F470D3DC}"/>
-                    </a:ext>
-                  </a:extLst>
-                </p:cNvPr>
-                <p:cNvGrpSpPr/>
-                <p:nvPr/>
-              </p:nvGrpSpPr>
-              <p:grpSpPr>
-                <a:xfrm>
-                  <a:off x="24251716" y="20586369"/>
-                  <a:ext cx="1292735" cy="1292735"/>
-                  <a:chOff x="0" y="0"/>
-                  <a:chExt cx="6350000" cy="6350000"/>
-                </a:xfrm>
-              </p:grpSpPr>
-              <p:sp>
-                <p:nvSpPr>
-                  <p:cNvPr id="1033" name="Freeform 13">
-                    <a:extLst>
-                      <a:ext uri="{FF2B5EF4-FFF2-40B4-BE49-F238E27FC236}">
-                        <a16:creationId xmlns:a16="http://schemas.microsoft.com/office/drawing/2014/main" id="{90EA6C3F-7653-33AC-E701-DE5892D35B4E}"/>
-                      </a:ext>
-                    </a:extLst>
-                  </p:cNvPr>
-                  <p:cNvSpPr/>
-                  <p:nvPr/>
-                </p:nvSpPr>
-                <p:spPr>
-                  <a:xfrm>
-                    <a:off x="0" y="0"/>
-                    <a:ext cx="6350000" cy="6350000"/>
-                  </a:xfrm>
-                  <a:custGeom>
-                    <a:avLst/>
-                    <a:gdLst/>
-                    <a:ahLst/>
-                    <a:cxnLst/>
-                    <a:rect l="l" t="t" r="r" b="b"/>
-                    <a:pathLst>
-                      <a:path w="6350000" h="6350000">
-                        <a:moveTo>
-                          <a:pt x="3175000" y="0"/>
-                        </a:moveTo>
-                        <a:cubicBezTo>
-                          <a:pt x="1421496" y="0"/>
-                          <a:pt x="0" y="1421496"/>
-                          <a:pt x="0" y="3175000"/>
-                        </a:cubicBezTo>
-                        <a:cubicBezTo>
-                          <a:pt x="0" y="4928504"/>
-                          <a:pt x="1421496" y="6350000"/>
-                          <a:pt x="3175000" y="6350000"/>
-                        </a:cubicBezTo>
-                        <a:cubicBezTo>
-                          <a:pt x="4928504" y="6350000"/>
-                          <a:pt x="6350000" y="4928504"/>
-                          <a:pt x="6350000" y="3175000"/>
-                        </a:cubicBezTo>
-                        <a:cubicBezTo>
-                          <a:pt x="6350000" y="1421496"/>
-                          <a:pt x="4928504" y="0"/>
-                          <a:pt x="3175000" y="0"/>
-                        </a:cubicBezTo>
-                        <a:close/>
-                      </a:path>
-                    </a:pathLst>
-                  </a:custGeom>
-                  <a:solidFill>
-                    <a:srgbClr val="A7DEC1"/>
-                  </a:solidFill>
-                </p:spPr>
-                <p:txBody>
-                  <a:bodyPr/>
-                  <a:lstStyle/>
-                  <a:p>
-                    <a:endParaRPr lang="en-US"/>
-                  </a:p>
-                </p:txBody>
-              </p:sp>
-            </p:grpSp>
-            <p:grpSp>
-              <p:nvGrpSpPr>
-                <p:cNvPr id="1041" name="Group 20">
-                  <a:extLst>
-                    <a:ext uri="{FF2B5EF4-FFF2-40B4-BE49-F238E27FC236}">
-                      <a16:creationId xmlns:a16="http://schemas.microsoft.com/office/drawing/2014/main" id="{B0815581-5B23-4622-E7B5-5307F57733FB}"/>
-                    </a:ext>
-                  </a:extLst>
-                </p:cNvPr>
-                <p:cNvGrpSpPr/>
-                <p:nvPr/>
-              </p:nvGrpSpPr>
-              <p:grpSpPr>
-                <a:xfrm>
-                  <a:off x="24414516" y="20749169"/>
-                  <a:ext cx="967135" cy="967135"/>
-                  <a:chOff x="0" y="0"/>
-                  <a:chExt cx="6350000" cy="6350000"/>
-                </a:xfrm>
-              </p:grpSpPr>
-              <p:sp>
-                <p:nvSpPr>
-                  <p:cNvPr id="1042" name="Freeform 21">
-                    <a:extLst>
-                      <a:ext uri="{FF2B5EF4-FFF2-40B4-BE49-F238E27FC236}">
-                        <a16:creationId xmlns:a16="http://schemas.microsoft.com/office/drawing/2014/main" id="{53261E5D-B459-E540-CE35-17E943183FE8}"/>
-                      </a:ext>
-                    </a:extLst>
-                  </p:cNvPr>
-                  <p:cNvSpPr/>
-                  <p:nvPr/>
-                </p:nvSpPr>
-                <p:spPr>
-                  <a:xfrm>
-                    <a:off x="0" y="0"/>
-                    <a:ext cx="6350000" cy="6350000"/>
-                  </a:xfrm>
-                  <a:custGeom>
-                    <a:avLst/>
-                    <a:gdLst/>
-                    <a:ahLst/>
-                    <a:cxnLst/>
-                    <a:rect l="l" t="t" r="r" b="b"/>
-                    <a:pathLst>
-                      <a:path w="6350000" h="6350000">
-                        <a:moveTo>
-                          <a:pt x="3175000" y="0"/>
-                        </a:moveTo>
-                        <a:cubicBezTo>
-                          <a:pt x="1421496" y="0"/>
-                          <a:pt x="0" y="1421496"/>
-                          <a:pt x="0" y="3175000"/>
-                        </a:cubicBezTo>
-                        <a:cubicBezTo>
-                          <a:pt x="0" y="4928504"/>
-                          <a:pt x="1421496" y="6350000"/>
-                          <a:pt x="3175000" y="6350000"/>
-                        </a:cubicBezTo>
-                        <a:cubicBezTo>
-                          <a:pt x="4928504" y="6350000"/>
-                          <a:pt x="6350000" y="4928504"/>
-                          <a:pt x="6350000" y="3175000"/>
-                        </a:cubicBezTo>
-                        <a:cubicBezTo>
-                          <a:pt x="6350000" y="1421496"/>
-                          <a:pt x="4928504" y="0"/>
-                          <a:pt x="3175000" y="0"/>
-                        </a:cubicBezTo>
-                        <a:close/>
-                      </a:path>
-                    </a:pathLst>
-                  </a:custGeom>
-                  <a:solidFill>
-                    <a:srgbClr val="FFFFFF"/>
-                  </a:solidFill>
-                </p:spPr>
-                <p:txBody>
-                  <a:bodyPr/>
-                  <a:lstStyle/>
-                  <a:p>
-                    <a:endParaRPr lang="en-US"/>
-                  </a:p>
-                </p:txBody>
-              </p:sp>
-            </p:grpSp>
-            <p:sp>
-              <p:nvSpPr>
-                <p:cNvPr id="1051" name="Freeform 30">
-                  <a:extLst>
-                    <a:ext uri="{FF2B5EF4-FFF2-40B4-BE49-F238E27FC236}">
-                      <a16:creationId xmlns:a16="http://schemas.microsoft.com/office/drawing/2014/main" id="{B04973DB-4C60-0B80-CD48-46F23DF2F1B4}"/>
-                    </a:ext>
-                  </a:extLst>
-                </p:cNvPr>
-                <p:cNvSpPr/>
-                <p:nvPr/>
-              </p:nvSpPr>
-              <p:spPr>
-                <a:xfrm>
-                  <a:off x="24602418" y="20973961"/>
-                  <a:ext cx="627744" cy="489640"/>
-                </a:xfrm>
-                <a:custGeom>
-                  <a:avLst/>
-                  <a:gdLst/>
-                  <a:ahLst/>
-                  <a:cxnLst/>
-                  <a:rect l="l" t="t" r="r" b="b"/>
-                  <a:pathLst>
-                    <a:path w="328402" h="256153">
-                      <a:moveTo>
-                        <a:pt x="0" y="0"/>
-                      </a:moveTo>
-                      <a:lnTo>
-                        <a:pt x="328402" y="0"/>
-                      </a:lnTo>
-                      <a:lnTo>
-                        <a:pt x="328402" y="256154"/>
-                      </a:lnTo>
-                      <a:lnTo>
-                        <a:pt x="0" y="256154"/>
-                      </a:lnTo>
-                      <a:lnTo>
-                        <a:pt x="0" y="0"/>
-                      </a:lnTo>
-                      <a:close/>
-                    </a:path>
-                  </a:pathLst>
-                </a:custGeom>
-                <a:blipFill>
-                  <a:blip r:embed="rId16">
-                    <a:extLst>
-                      <a:ext uri="{96DAC541-7B7A-43D3-8B79-37D633B846F1}">
-                        <asvg:svgBlip xmlns:asvg="http://schemas.microsoft.com/office/drawing/2016/SVG/main" r:embed="rId17"/>
-                      </a:ext>
-                    </a:extLst>
-                  </a:blip>
-                  <a:stretch>
-                    <a:fillRect/>
-                  </a:stretch>
-                </a:blipFill>
-              </p:spPr>
-              <p:txBody>
-                <a:bodyPr/>
-                <a:lstStyle/>
-                <a:p>
-                  <a:endParaRPr lang="en-US"/>
-                </a:p>
-              </p:txBody>
-            </p:sp>
-          </p:grpSp>
-          <p:grpSp>
-            <p:nvGrpSpPr>
-              <p:cNvPr id="1070" name="Group 1069">
-                <a:extLst>
-                  <a:ext uri="{FF2B5EF4-FFF2-40B4-BE49-F238E27FC236}">
-                    <a16:creationId xmlns:a16="http://schemas.microsoft.com/office/drawing/2014/main" id="{29835E96-7E0C-B877-C4A9-D3B166176DB8}"/>
-                  </a:ext>
-                </a:extLst>
-              </p:cNvPr>
-              <p:cNvGrpSpPr/>
-              <p:nvPr/>
-            </p:nvGrpSpPr>
-            <p:grpSpPr>
-              <a:xfrm>
-                <a:off x="26166011" y="22559411"/>
-                <a:ext cx="1292735" cy="1292735"/>
-                <a:chOff x="26064327" y="22462219"/>
-                <a:chExt cx="1292735" cy="1292735"/>
-              </a:xfrm>
-            </p:grpSpPr>
-            <p:grpSp>
-              <p:nvGrpSpPr>
-                <p:cNvPr id="1035" name="Group 14">
-                  <a:extLst>
-                    <a:ext uri="{FF2B5EF4-FFF2-40B4-BE49-F238E27FC236}">
-                      <a16:creationId xmlns:a16="http://schemas.microsoft.com/office/drawing/2014/main" id="{5B8F8587-839E-40FC-77AB-2A489911A250}"/>
-                    </a:ext>
-                  </a:extLst>
-                </p:cNvPr>
-                <p:cNvGrpSpPr/>
-                <p:nvPr/>
-              </p:nvGrpSpPr>
-              <p:grpSpPr>
-                <a:xfrm>
-                  <a:off x="26064327" y="22462219"/>
-                  <a:ext cx="1292735" cy="1292735"/>
-                  <a:chOff x="0" y="0"/>
-                  <a:chExt cx="6350000" cy="6350000"/>
-                </a:xfrm>
-              </p:grpSpPr>
-              <p:sp>
-                <p:nvSpPr>
-                  <p:cNvPr id="1036" name="Freeform 15">
-                    <a:extLst>
-                      <a:ext uri="{FF2B5EF4-FFF2-40B4-BE49-F238E27FC236}">
-                        <a16:creationId xmlns:a16="http://schemas.microsoft.com/office/drawing/2014/main" id="{3EA6634D-698B-28F0-FC6A-ED422A25958A}"/>
-                      </a:ext>
-                    </a:extLst>
-                  </p:cNvPr>
-                  <p:cNvSpPr/>
-                  <p:nvPr/>
-                </p:nvSpPr>
-                <p:spPr>
-                  <a:xfrm>
-                    <a:off x="0" y="0"/>
-                    <a:ext cx="6350000" cy="6350000"/>
-                  </a:xfrm>
-                  <a:custGeom>
-                    <a:avLst/>
-                    <a:gdLst/>
-                    <a:ahLst/>
-                    <a:cxnLst/>
-                    <a:rect l="l" t="t" r="r" b="b"/>
-                    <a:pathLst>
-                      <a:path w="6350000" h="6350000">
-                        <a:moveTo>
-                          <a:pt x="3175000" y="0"/>
-                        </a:moveTo>
-                        <a:cubicBezTo>
-                          <a:pt x="1421496" y="0"/>
-                          <a:pt x="0" y="1421496"/>
-                          <a:pt x="0" y="3175000"/>
-                        </a:cubicBezTo>
-                        <a:cubicBezTo>
-                          <a:pt x="0" y="4928504"/>
-                          <a:pt x="1421496" y="6350000"/>
-                          <a:pt x="3175000" y="6350000"/>
-                        </a:cubicBezTo>
-                        <a:cubicBezTo>
-                          <a:pt x="4928504" y="6350000"/>
-                          <a:pt x="6350000" y="4928504"/>
-                          <a:pt x="6350000" y="3175000"/>
-                        </a:cubicBezTo>
-                        <a:cubicBezTo>
-                          <a:pt x="6350000" y="1421496"/>
-                          <a:pt x="4928504" y="0"/>
-                          <a:pt x="3175000" y="0"/>
-                        </a:cubicBezTo>
-                        <a:close/>
-                      </a:path>
-                    </a:pathLst>
-                  </a:custGeom>
-                  <a:solidFill>
-                    <a:srgbClr val="76B900"/>
-                  </a:solidFill>
-                </p:spPr>
-                <p:txBody>
-                  <a:bodyPr/>
-                  <a:lstStyle/>
-                  <a:p>
-                    <a:endParaRPr lang="en-US"/>
-                  </a:p>
-                </p:txBody>
-              </p:sp>
-            </p:grpSp>
-            <p:grpSp>
-              <p:nvGrpSpPr>
-                <p:cNvPr id="1043" name="Group 22">
-                  <a:extLst>
-                    <a:ext uri="{FF2B5EF4-FFF2-40B4-BE49-F238E27FC236}">
-                      <a16:creationId xmlns:a16="http://schemas.microsoft.com/office/drawing/2014/main" id="{DF5A7922-F18E-DDE5-030A-01E2CA146EF3}"/>
-                    </a:ext>
-                  </a:extLst>
-                </p:cNvPr>
-                <p:cNvGrpSpPr/>
-                <p:nvPr/>
-              </p:nvGrpSpPr>
-              <p:grpSpPr>
-                <a:xfrm>
-                  <a:off x="26227126" y="22625019"/>
-                  <a:ext cx="967135" cy="967135"/>
-                  <a:chOff x="0" y="0"/>
-                  <a:chExt cx="6350000" cy="6350000"/>
-                </a:xfrm>
-              </p:grpSpPr>
-              <p:sp>
-                <p:nvSpPr>
-                  <p:cNvPr id="1044" name="Freeform 23">
-                    <a:extLst>
-                      <a:ext uri="{FF2B5EF4-FFF2-40B4-BE49-F238E27FC236}">
-                        <a16:creationId xmlns:a16="http://schemas.microsoft.com/office/drawing/2014/main" id="{159639CC-CEC7-5B0D-0815-02A3ADF7720A}"/>
-                      </a:ext>
-                    </a:extLst>
-                  </p:cNvPr>
-                  <p:cNvSpPr/>
-                  <p:nvPr/>
-                </p:nvSpPr>
-                <p:spPr>
-                  <a:xfrm>
-                    <a:off x="0" y="0"/>
-                    <a:ext cx="6350000" cy="6350000"/>
-                  </a:xfrm>
-                  <a:custGeom>
-                    <a:avLst/>
-                    <a:gdLst/>
-                    <a:ahLst/>
-                    <a:cxnLst/>
-                    <a:rect l="l" t="t" r="r" b="b"/>
-                    <a:pathLst>
-                      <a:path w="6350000" h="6350000">
-                        <a:moveTo>
-                          <a:pt x="3175000" y="0"/>
-                        </a:moveTo>
-                        <a:cubicBezTo>
-                          <a:pt x="1421496" y="0"/>
-                          <a:pt x="0" y="1421496"/>
-                          <a:pt x="0" y="3175000"/>
-                        </a:cubicBezTo>
-                        <a:cubicBezTo>
-                          <a:pt x="0" y="4928504"/>
-                          <a:pt x="1421496" y="6350000"/>
-                          <a:pt x="3175000" y="6350000"/>
-                        </a:cubicBezTo>
-                        <a:cubicBezTo>
-                          <a:pt x="4928504" y="6350000"/>
-                          <a:pt x="6350000" y="4928504"/>
-                          <a:pt x="6350000" y="3175000"/>
-                        </a:cubicBezTo>
-                        <a:cubicBezTo>
-                          <a:pt x="6350000" y="1421496"/>
-                          <a:pt x="4928504" y="0"/>
-                          <a:pt x="3175000" y="0"/>
-                        </a:cubicBezTo>
-                        <a:close/>
-                      </a:path>
-                    </a:pathLst>
-                  </a:custGeom>
-                  <a:solidFill>
-                    <a:srgbClr val="FFFFFF"/>
-                  </a:solidFill>
-                </p:spPr>
-                <p:txBody>
-                  <a:bodyPr/>
-                  <a:lstStyle/>
-                  <a:p>
-                    <a:endParaRPr lang="en-US"/>
-                  </a:p>
-                </p:txBody>
-              </p:sp>
-            </p:grpSp>
-            <p:sp>
-              <p:nvSpPr>
-                <p:cNvPr id="1052" name="Freeform 31">
-                  <a:extLst>
-                    <a:ext uri="{FF2B5EF4-FFF2-40B4-BE49-F238E27FC236}">
-                      <a16:creationId xmlns:a16="http://schemas.microsoft.com/office/drawing/2014/main" id="{7D2FFEDC-1D13-B4CA-C9FD-B57EAED21183}"/>
-                    </a:ext>
-                  </a:extLst>
-                </p:cNvPr>
-                <p:cNvSpPr/>
-                <p:nvPr/>
-              </p:nvSpPr>
-              <p:spPr>
-                <a:xfrm>
-                  <a:off x="26376549" y="22774442"/>
-                  <a:ext cx="668291" cy="668291"/>
-                </a:xfrm>
-                <a:custGeom>
-                  <a:avLst/>
-                  <a:gdLst/>
-                  <a:ahLst/>
-                  <a:cxnLst/>
-                  <a:rect l="l" t="t" r="r" b="b"/>
-                  <a:pathLst>
-                    <a:path w="349614" h="349614">
-                      <a:moveTo>
-                        <a:pt x="0" y="0"/>
-                      </a:moveTo>
-                      <a:lnTo>
-                        <a:pt x="349614" y="0"/>
-                      </a:lnTo>
-                      <a:lnTo>
-                        <a:pt x="349614" y="349614"/>
-                      </a:lnTo>
-                      <a:lnTo>
-                        <a:pt x="0" y="349614"/>
-                      </a:lnTo>
-                      <a:lnTo>
-                        <a:pt x="0" y="0"/>
-                      </a:lnTo>
-                      <a:close/>
-                    </a:path>
-                  </a:pathLst>
-                </a:custGeom>
-                <a:blipFill>
-                  <a:blip r:embed="rId18">
-                    <a:extLst>
-                      <a:ext uri="{96DAC541-7B7A-43D3-8B79-37D633B846F1}">
-                        <asvg:svgBlip xmlns:asvg="http://schemas.microsoft.com/office/drawing/2016/SVG/main" r:embed="rId19"/>
-                      </a:ext>
-                    </a:extLst>
-                  </a:blip>
-                  <a:stretch>
-                    <a:fillRect/>
-                  </a:stretch>
-                </a:blipFill>
-              </p:spPr>
-              <p:txBody>
-                <a:bodyPr/>
-                <a:lstStyle/>
-                <a:p>
-                  <a:endParaRPr lang="en-US"/>
-                </a:p>
-              </p:txBody>
-            </p:sp>
-          </p:grpSp>
-          <p:grpSp>
-            <p:nvGrpSpPr>
-              <p:cNvPr id="1073" name="Group 1072">
-                <a:extLst>
-                  <a:ext uri="{FF2B5EF4-FFF2-40B4-BE49-F238E27FC236}">
-                    <a16:creationId xmlns:a16="http://schemas.microsoft.com/office/drawing/2014/main" id="{71B9789F-2049-6B82-4C23-2ED32C790620}"/>
-                  </a:ext>
-                </a:extLst>
-              </p:cNvPr>
-              <p:cNvGrpSpPr/>
-              <p:nvPr/>
-            </p:nvGrpSpPr>
-            <p:grpSpPr>
-              <a:xfrm>
-                <a:off x="28185879" y="24788824"/>
-                <a:ext cx="1292735" cy="1292735"/>
-                <a:chOff x="27987943" y="25231257"/>
-                <a:chExt cx="1292735" cy="1292735"/>
-              </a:xfrm>
-            </p:grpSpPr>
-            <p:grpSp>
-              <p:nvGrpSpPr>
-                <p:cNvPr id="1037" name="Group 16">
-                  <a:extLst>
-                    <a:ext uri="{FF2B5EF4-FFF2-40B4-BE49-F238E27FC236}">
-                      <a16:creationId xmlns:a16="http://schemas.microsoft.com/office/drawing/2014/main" id="{6421F865-1D98-EC01-7B92-70CC9D9B7D97}"/>
-                    </a:ext>
-                  </a:extLst>
-                </p:cNvPr>
-                <p:cNvGrpSpPr/>
-                <p:nvPr/>
-              </p:nvGrpSpPr>
-              <p:grpSpPr>
-                <a:xfrm>
-                  <a:off x="27987943" y="25231257"/>
-                  <a:ext cx="1292735" cy="1292735"/>
-                  <a:chOff x="0" y="0"/>
-                  <a:chExt cx="6350000" cy="6350000"/>
-                </a:xfrm>
-              </p:grpSpPr>
-              <p:sp>
-                <p:nvSpPr>
-                  <p:cNvPr id="1038" name="Freeform 17">
-                    <a:extLst>
-                      <a:ext uri="{FF2B5EF4-FFF2-40B4-BE49-F238E27FC236}">
-                        <a16:creationId xmlns:a16="http://schemas.microsoft.com/office/drawing/2014/main" id="{92F1CEE0-20AF-9787-0796-62DDBA8AA066}"/>
-                      </a:ext>
-                    </a:extLst>
-                  </p:cNvPr>
-                  <p:cNvSpPr/>
-                  <p:nvPr/>
-                </p:nvSpPr>
-                <p:spPr>
-                  <a:xfrm>
-                    <a:off x="0" y="0"/>
-                    <a:ext cx="6350000" cy="6350000"/>
-                  </a:xfrm>
-                  <a:custGeom>
-                    <a:avLst/>
-                    <a:gdLst/>
-                    <a:ahLst/>
-                    <a:cxnLst/>
-                    <a:rect l="l" t="t" r="r" b="b"/>
-                    <a:pathLst>
-                      <a:path w="6350000" h="6350000">
-                        <a:moveTo>
-                          <a:pt x="3175000" y="0"/>
-                        </a:moveTo>
-                        <a:cubicBezTo>
-                          <a:pt x="1421496" y="0"/>
-                          <a:pt x="0" y="1421496"/>
-                          <a:pt x="0" y="3175000"/>
-                        </a:cubicBezTo>
-                        <a:cubicBezTo>
-                          <a:pt x="0" y="4928504"/>
-                          <a:pt x="1421496" y="6350000"/>
-                          <a:pt x="3175000" y="6350000"/>
-                        </a:cubicBezTo>
-                        <a:cubicBezTo>
-                          <a:pt x="4928504" y="6350000"/>
-                          <a:pt x="6350000" y="4928504"/>
-                          <a:pt x="6350000" y="3175000"/>
-                        </a:cubicBezTo>
-                        <a:cubicBezTo>
-                          <a:pt x="6350000" y="1421496"/>
-                          <a:pt x="4928504" y="0"/>
-                          <a:pt x="3175000" y="0"/>
-                        </a:cubicBezTo>
-                        <a:close/>
-                      </a:path>
-                    </a:pathLst>
-                  </a:custGeom>
-                  <a:solidFill>
-                    <a:srgbClr val="AAC6E7"/>
-                  </a:solidFill>
-                </p:spPr>
-                <p:txBody>
-                  <a:bodyPr/>
-                  <a:lstStyle/>
-                  <a:p>
-                    <a:endParaRPr lang="en-US"/>
-                  </a:p>
-                </p:txBody>
-              </p:sp>
-            </p:grpSp>
-            <p:grpSp>
-              <p:nvGrpSpPr>
-                <p:cNvPr id="1045" name="Group 24">
-                  <a:extLst>
-                    <a:ext uri="{FF2B5EF4-FFF2-40B4-BE49-F238E27FC236}">
-                      <a16:creationId xmlns:a16="http://schemas.microsoft.com/office/drawing/2014/main" id="{EBA2DABF-12DC-4D9C-6A1A-1142C0445F30}"/>
-                    </a:ext>
-                  </a:extLst>
-                </p:cNvPr>
-                <p:cNvGrpSpPr/>
-                <p:nvPr/>
-              </p:nvGrpSpPr>
-              <p:grpSpPr>
-                <a:xfrm>
-                  <a:off x="28150743" y="25394056"/>
-                  <a:ext cx="967135" cy="967135"/>
-                  <a:chOff x="0" y="0"/>
-                  <a:chExt cx="6350000" cy="6350000"/>
-                </a:xfrm>
-              </p:grpSpPr>
-              <p:sp>
-                <p:nvSpPr>
-                  <p:cNvPr id="1046" name="Freeform 25">
-                    <a:extLst>
-                      <a:ext uri="{FF2B5EF4-FFF2-40B4-BE49-F238E27FC236}">
-                        <a16:creationId xmlns:a16="http://schemas.microsoft.com/office/drawing/2014/main" id="{F86B9055-10D1-D206-D598-ABDC07F850A7}"/>
-                      </a:ext>
-                    </a:extLst>
-                  </p:cNvPr>
-                  <p:cNvSpPr/>
-                  <p:nvPr/>
-                </p:nvSpPr>
-                <p:spPr>
-                  <a:xfrm>
-                    <a:off x="0" y="0"/>
-                    <a:ext cx="6350000" cy="6350000"/>
-                  </a:xfrm>
-                  <a:custGeom>
-                    <a:avLst/>
-                    <a:gdLst/>
-                    <a:ahLst/>
-                    <a:cxnLst/>
-                    <a:rect l="l" t="t" r="r" b="b"/>
-                    <a:pathLst>
-                      <a:path w="6350000" h="6350000">
-                        <a:moveTo>
-                          <a:pt x="3175000" y="0"/>
-                        </a:moveTo>
-                        <a:cubicBezTo>
-                          <a:pt x="1421496" y="0"/>
-                          <a:pt x="0" y="1421496"/>
-                          <a:pt x="0" y="3175000"/>
-                        </a:cubicBezTo>
-                        <a:cubicBezTo>
-                          <a:pt x="0" y="4928504"/>
-                          <a:pt x="1421496" y="6350000"/>
-                          <a:pt x="3175000" y="6350000"/>
-                        </a:cubicBezTo>
-                        <a:cubicBezTo>
-                          <a:pt x="4928504" y="6350000"/>
-                          <a:pt x="6350000" y="4928504"/>
-                          <a:pt x="6350000" y="3175000"/>
-                        </a:cubicBezTo>
-                        <a:cubicBezTo>
-                          <a:pt x="6350000" y="1421496"/>
-                          <a:pt x="4928504" y="0"/>
-                          <a:pt x="3175000" y="0"/>
-                        </a:cubicBezTo>
-                        <a:close/>
-                      </a:path>
-                    </a:pathLst>
-                  </a:custGeom>
-                  <a:solidFill>
-                    <a:srgbClr val="FFFFFF"/>
-                  </a:solidFill>
-                </p:spPr>
-                <p:txBody>
-                  <a:bodyPr/>
-                  <a:lstStyle/>
-                  <a:p>
-                    <a:endParaRPr lang="en-US"/>
-                  </a:p>
-                </p:txBody>
-              </p:sp>
-            </p:grpSp>
-            <p:sp>
-              <p:nvSpPr>
-                <p:cNvPr id="1053" name="Freeform 32">
-                  <a:extLst>
-                    <a:ext uri="{FF2B5EF4-FFF2-40B4-BE49-F238E27FC236}">
-                      <a16:creationId xmlns:a16="http://schemas.microsoft.com/office/drawing/2014/main" id="{034FB8FE-BA7F-63A6-EDE0-08441C61634C}"/>
-                    </a:ext>
-                  </a:extLst>
-                </p:cNvPr>
-                <p:cNvSpPr/>
-                <p:nvPr/>
-              </p:nvSpPr>
-              <p:spPr>
-                <a:xfrm>
-                  <a:off x="28380384" y="25596306"/>
-                  <a:ext cx="653510" cy="596476"/>
-                </a:xfrm>
-                <a:custGeom>
-                  <a:avLst/>
-                  <a:gdLst/>
-                  <a:ahLst/>
-                  <a:cxnLst/>
-                  <a:rect l="l" t="t" r="r" b="b"/>
-                  <a:pathLst>
-                    <a:path w="341881" h="312044">
-                      <a:moveTo>
-                        <a:pt x="0" y="0"/>
-                      </a:moveTo>
-                      <a:lnTo>
-                        <a:pt x="341882" y="0"/>
-                      </a:lnTo>
-                      <a:lnTo>
-                        <a:pt x="341882" y="312044"/>
-                      </a:lnTo>
-                      <a:lnTo>
-                        <a:pt x="0" y="312044"/>
-                      </a:lnTo>
-                      <a:lnTo>
-                        <a:pt x="0" y="0"/>
-                      </a:lnTo>
-                      <a:close/>
-                    </a:path>
-                  </a:pathLst>
-                </a:custGeom>
-                <a:blipFill>
-                  <a:blip r:embed="rId20">
-                    <a:extLst>
-                      <a:ext uri="{96DAC541-7B7A-43D3-8B79-37D633B846F1}">
-                        <asvg:svgBlip xmlns:asvg="http://schemas.microsoft.com/office/drawing/2016/SVG/main" r:embed="rId21"/>
-                      </a:ext>
-                    </a:extLst>
-                  </a:blip>
-                  <a:stretch>
-                    <a:fillRect/>
-                  </a:stretch>
-                </a:blipFill>
-              </p:spPr>
-              <p:txBody>
-                <a:bodyPr/>
-                <a:lstStyle/>
-                <a:p>
-                  <a:endParaRPr lang="en-US"/>
-                </a:p>
-              </p:txBody>
-            </p:sp>
-          </p:grpSp>
-          <p:sp>
-            <p:nvSpPr>
-              <p:cNvPr id="1063" name="TextBox 1062">
-                <a:extLst>
-                  <a:ext uri="{FF2B5EF4-FFF2-40B4-BE49-F238E27FC236}">
-                    <a16:creationId xmlns:a16="http://schemas.microsoft.com/office/drawing/2014/main" id="{2EA3AD57-6D1C-FB8E-6A01-45B77904C750}"/>
-                  </a:ext>
-                </a:extLst>
-              </p:cNvPr>
-              <p:cNvSpPr txBox="1"/>
-              <p:nvPr/>
-            </p:nvSpPr>
-            <p:spPr>
-              <a:xfrm>
-                <a:off x="15777803" y="18833036"/>
-                <a:ext cx="3045761" cy="677108"/>
-              </a:xfrm>
-              <a:prstGeom prst="rect">
-                <a:avLst/>
-              </a:prstGeom>
-              <a:noFill/>
-            </p:spPr>
-            <p:txBody>
-              <a:bodyPr wrap="square" rtlCol="0">
-                <a:spAutoFit/>
-              </a:bodyPr>
-              <a:lstStyle/>
-              <a:p>
-                <a:r>
-                  <a:rPr lang="en-US" sz="3800" b="1" dirty="0">
-                    <a:latin typeface="Arial" panose="020B0604020202020204" pitchFamily="34" charset="0"/>
-                    <a:cs typeface="Arial" panose="020B0604020202020204" pitchFamily="34" charset="0"/>
-                  </a:rPr>
-                  <a:t>Real World</a:t>
-                </a:r>
-              </a:p>
-            </p:txBody>
-          </p:sp>
-          <p:sp>
-            <p:nvSpPr>
-              <p:cNvPr id="1064" name="TextBox 1063">
-                <a:extLst>
-                  <a:ext uri="{FF2B5EF4-FFF2-40B4-BE49-F238E27FC236}">
-                    <a16:creationId xmlns:a16="http://schemas.microsoft.com/office/drawing/2014/main" id="{CA8B883F-9BC1-FD13-E450-12A36DAD7749}"/>
-                  </a:ext>
-                </a:extLst>
-              </p:cNvPr>
-              <p:cNvSpPr txBox="1"/>
-              <p:nvPr/>
-            </p:nvSpPr>
-            <p:spPr>
-              <a:xfrm>
-                <a:off x="17781196" y="21017416"/>
-                <a:ext cx="5205961" cy="677108"/>
-              </a:xfrm>
-              <a:prstGeom prst="rect">
-                <a:avLst/>
-              </a:prstGeom>
-              <a:noFill/>
-            </p:spPr>
-            <p:txBody>
-              <a:bodyPr wrap="square" rtlCol="0">
-                <a:spAutoFit/>
-              </a:bodyPr>
-              <a:lstStyle/>
-              <a:p>
-                <a:r>
-                  <a:rPr lang="en-US" sz="3800" b="1" dirty="0">
-                    <a:latin typeface="Arial" panose="020B0604020202020204" pitchFamily="34" charset="0"/>
-                    <a:cs typeface="Arial" panose="020B0604020202020204" pitchFamily="34" charset="0"/>
-                  </a:rPr>
-                  <a:t>RealSense Camera</a:t>
-                </a:r>
-              </a:p>
-            </p:txBody>
-          </p:sp>
-          <p:sp>
-            <p:nvSpPr>
-              <p:cNvPr id="1066" name="TextBox 1065">
-                <a:extLst>
-                  <a:ext uri="{FF2B5EF4-FFF2-40B4-BE49-F238E27FC236}">
-                    <a16:creationId xmlns:a16="http://schemas.microsoft.com/office/drawing/2014/main" id="{22BCD936-C8DE-B4A9-7BC6-68D3DBCC4F78}"/>
-                  </a:ext>
-                </a:extLst>
-              </p:cNvPr>
-              <p:cNvSpPr txBox="1"/>
-              <p:nvPr/>
-            </p:nvSpPr>
-            <p:spPr>
-              <a:xfrm>
-                <a:off x="16072686" y="19386594"/>
-                <a:ext cx="5801184" cy="1200329"/>
-              </a:xfrm>
-              <a:prstGeom prst="rect">
-                <a:avLst/>
-              </a:prstGeom>
-              <a:noFill/>
-            </p:spPr>
-            <p:txBody>
-              <a:bodyPr wrap="square" rtlCol="0">
-                <a:spAutoFit/>
-              </a:bodyPr>
-              <a:lstStyle/>
-              <a:p>
-                <a:r>
-                  <a:rPr lang="en-US" sz="3600" dirty="0">
-                    <a:latin typeface="Arial" panose="020B0604020202020204" pitchFamily="34" charset="0"/>
-                    <a:cs typeface="Arial" panose="020B0604020202020204" pitchFamily="34" charset="0"/>
-                  </a:rPr>
-                  <a:t>Person will stand in front of the robot</a:t>
-                </a:r>
-              </a:p>
-            </p:txBody>
-          </p:sp>
-          <p:sp>
-            <p:nvSpPr>
-              <p:cNvPr id="1069" name="TextBox 1068">
-                <a:extLst>
-                  <a:ext uri="{FF2B5EF4-FFF2-40B4-BE49-F238E27FC236}">
-                    <a16:creationId xmlns:a16="http://schemas.microsoft.com/office/drawing/2014/main" id="{14880C14-8609-861D-2EEF-4AE0FEFB4CB1}"/>
-                  </a:ext>
-                </a:extLst>
-              </p:cNvPr>
-              <p:cNvSpPr txBox="1"/>
-              <p:nvPr/>
-            </p:nvSpPr>
-            <p:spPr>
-              <a:xfrm>
-                <a:off x="18044805" y="21567306"/>
-                <a:ext cx="5801184" cy="1200329"/>
-              </a:xfrm>
-              <a:prstGeom prst="rect">
-                <a:avLst/>
-              </a:prstGeom>
-              <a:noFill/>
-            </p:spPr>
-            <p:txBody>
-              <a:bodyPr wrap="square" rtlCol="0">
-                <a:spAutoFit/>
-              </a:bodyPr>
-              <a:lstStyle/>
-              <a:p>
-                <a:r>
-                  <a:rPr lang="en-US" sz="3600" dirty="0">
-                    <a:latin typeface="Arial" panose="020B0604020202020204" pitchFamily="34" charset="0"/>
-                    <a:cs typeface="Arial" panose="020B0604020202020204" pitchFamily="34" charset="0"/>
-                  </a:rPr>
-                  <a:t>Captures depth and RGB data of environment</a:t>
-                </a:r>
-              </a:p>
-            </p:txBody>
-          </p:sp>
-          <p:sp>
-            <p:nvSpPr>
-              <p:cNvPr id="1071" name="TextBox 1070">
-                <a:extLst>
-                  <a:ext uri="{FF2B5EF4-FFF2-40B4-BE49-F238E27FC236}">
-                    <a16:creationId xmlns:a16="http://schemas.microsoft.com/office/drawing/2014/main" id="{80492261-46FB-C9FF-EC43-03A8FA12608E}"/>
-                  </a:ext>
-                </a:extLst>
-              </p:cNvPr>
-              <p:cNvSpPr txBox="1"/>
-              <p:nvPr/>
-            </p:nvSpPr>
-            <p:spPr>
-              <a:xfrm>
-                <a:off x="19827129" y="23038605"/>
-                <a:ext cx="5897977" cy="677108"/>
-              </a:xfrm>
-              <a:prstGeom prst="rect">
-                <a:avLst/>
-              </a:prstGeom>
-              <a:noFill/>
-            </p:spPr>
-            <p:txBody>
-              <a:bodyPr wrap="square" rtlCol="0">
-                <a:spAutoFit/>
-              </a:bodyPr>
-              <a:lstStyle/>
-              <a:p>
-                <a:r>
-                  <a:rPr lang="en-US" sz="3800" b="1" dirty="0">
-                    <a:latin typeface="Arial" panose="020B0604020202020204" pitchFamily="34" charset="0"/>
-                    <a:cs typeface="Arial" panose="020B0604020202020204" pitchFamily="34" charset="0"/>
-                  </a:rPr>
-                  <a:t>Process and Simulation</a:t>
-                </a:r>
-              </a:p>
-            </p:txBody>
-          </p:sp>
-          <p:sp>
-            <p:nvSpPr>
-              <p:cNvPr id="1072" name="TextBox 1071">
-                <a:extLst>
-                  <a:ext uri="{FF2B5EF4-FFF2-40B4-BE49-F238E27FC236}">
-                    <a16:creationId xmlns:a16="http://schemas.microsoft.com/office/drawing/2014/main" id="{BACB65BF-EB50-2B14-91CC-DBC106522F11}"/>
-                  </a:ext>
-                </a:extLst>
-              </p:cNvPr>
-              <p:cNvSpPr txBox="1"/>
-              <p:nvPr/>
-            </p:nvSpPr>
-            <p:spPr>
-              <a:xfrm>
-                <a:off x="20090738" y="23588495"/>
-                <a:ext cx="5801184" cy="1200329"/>
-              </a:xfrm>
-              <a:prstGeom prst="rect">
-                <a:avLst/>
-              </a:prstGeom>
-              <a:noFill/>
-            </p:spPr>
-            <p:txBody>
-              <a:bodyPr wrap="square" rtlCol="0">
-                <a:spAutoFit/>
-              </a:bodyPr>
-              <a:lstStyle/>
-              <a:p>
-                <a:r>
-                  <a:rPr lang="en-US" sz="3600" dirty="0">
-                    <a:latin typeface="Arial" panose="020B0604020202020204" pitchFamily="34" charset="0"/>
-                    <a:cs typeface="Arial" panose="020B0604020202020204" pitchFamily="34" charset="0"/>
-                  </a:rPr>
-                  <a:t>OpenCV and Isaac Sim to simulate environment</a:t>
-                </a:r>
-              </a:p>
-            </p:txBody>
-          </p:sp>
-          <p:sp>
-            <p:nvSpPr>
-              <p:cNvPr id="1074" name="TextBox 1073">
-                <a:extLst>
-                  <a:ext uri="{FF2B5EF4-FFF2-40B4-BE49-F238E27FC236}">
-                    <a16:creationId xmlns:a16="http://schemas.microsoft.com/office/drawing/2014/main" id="{89588C56-9A06-C920-D29B-8E4EFC354283}"/>
-                  </a:ext>
-                </a:extLst>
-              </p:cNvPr>
-              <p:cNvSpPr txBox="1"/>
-              <p:nvPr/>
-            </p:nvSpPr>
-            <p:spPr>
-              <a:xfrm>
-                <a:off x="21790433" y="25177400"/>
-                <a:ext cx="5205961" cy="677108"/>
-              </a:xfrm>
-              <a:prstGeom prst="rect">
-                <a:avLst/>
-              </a:prstGeom>
-              <a:noFill/>
-            </p:spPr>
-            <p:txBody>
-              <a:bodyPr wrap="square" rtlCol="0">
-                <a:spAutoFit/>
-              </a:bodyPr>
-              <a:lstStyle/>
-              <a:p>
-                <a:r>
-                  <a:rPr lang="en-US" sz="3800" b="1" dirty="0" err="1">
-                    <a:latin typeface="Arial" panose="020B0604020202020204" pitchFamily="34" charset="0"/>
-                    <a:cs typeface="Arial" panose="020B0604020202020204" pitchFamily="34" charset="0"/>
-                  </a:rPr>
-                  <a:t>Cobot</a:t>
-                </a:r>
-                <a:endParaRPr lang="en-US" sz="3800" b="1" dirty="0">
-                  <a:latin typeface="Arial" panose="020B0604020202020204" pitchFamily="34" charset="0"/>
-                  <a:cs typeface="Arial" panose="020B0604020202020204" pitchFamily="34" charset="0"/>
-                </a:endParaRPr>
-              </a:p>
-            </p:txBody>
-          </p:sp>
-          <p:sp>
-            <p:nvSpPr>
-              <p:cNvPr id="1075" name="TextBox 1074">
-                <a:extLst>
-                  <a:ext uri="{FF2B5EF4-FFF2-40B4-BE49-F238E27FC236}">
-                    <a16:creationId xmlns:a16="http://schemas.microsoft.com/office/drawing/2014/main" id="{61253ADF-517A-7E8B-BA6A-06450636805C}"/>
-                  </a:ext>
-                </a:extLst>
-              </p:cNvPr>
-              <p:cNvSpPr txBox="1"/>
-              <p:nvPr/>
-            </p:nvSpPr>
-            <p:spPr>
-              <a:xfrm>
-                <a:off x="22054042" y="25727290"/>
-                <a:ext cx="5801184" cy="1200329"/>
-              </a:xfrm>
-              <a:prstGeom prst="rect">
-                <a:avLst/>
-              </a:prstGeom>
-              <a:noFill/>
-            </p:spPr>
-            <p:txBody>
-              <a:bodyPr wrap="square" rtlCol="0">
-                <a:spAutoFit/>
-              </a:bodyPr>
-              <a:lstStyle/>
-              <a:p>
-                <a:r>
-                  <a:rPr lang="en-US" sz="3600" dirty="0">
-                    <a:latin typeface="Arial" panose="020B0604020202020204" pitchFamily="34" charset="0"/>
-                    <a:cs typeface="Arial" panose="020B0604020202020204" pitchFamily="34" charset="0"/>
-                  </a:rPr>
-                  <a:t>Receives feedback and adjusts movements</a:t>
-                </a:r>
-              </a:p>
-            </p:txBody>
-          </p:sp>
-        </p:grpSp>
-      </p:grpSp>
-      <p:grpSp>
-        <p:nvGrpSpPr>
-          <p:cNvPr id="1077" name="Group 1076">
-            <a:extLst>
-              <a:ext uri="{FF2B5EF4-FFF2-40B4-BE49-F238E27FC236}">
-                <a16:creationId xmlns:a16="http://schemas.microsoft.com/office/drawing/2014/main" id="{747A58E0-3283-5D46-596C-A6C8B98C18E8}"/>
-              </a:ext>
-            </a:extLst>
-          </p:cNvPr>
-          <p:cNvGrpSpPr/>
-          <p:nvPr/>
-        </p:nvGrpSpPr>
-        <p:grpSpPr>
-          <a:xfrm>
-            <a:off x="12427734" y="23748406"/>
-            <a:ext cx="5215640" cy="3213795"/>
-            <a:chOff x="12005855" y="24098022"/>
-            <a:chExt cx="5215640" cy="3213795"/>
-          </a:xfrm>
-        </p:grpSpPr>
-        <p:pic>
-          <p:nvPicPr>
-            <p:cNvPr id="1034" name="Picture 10" descr="Nvidia Logo - PNG y Vector">
-              <a:extLst>
-                <a:ext uri="{FF2B5EF4-FFF2-40B4-BE49-F238E27FC236}">
-                  <a16:creationId xmlns:a16="http://schemas.microsoft.com/office/drawing/2014/main" id="{83B7F37D-931E-DF97-C9E8-FFA8D855175B}"/>
-                </a:ext>
-              </a:extLst>
-            </p:cNvPr>
-            <p:cNvPicPr>
-              <a:picLocks noChangeAspect="1" noChangeArrowheads="1"/>
-            </p:cNvPicPr>
-            <p:nvPr/>
-          </p:nvPicPr>
-          <p:blipFill rotWithShape="1">
-            <a:blip r:embed="rId22">
-              <a:extLst>
-                <a:ext uri="{28A0092B-C50C-407E-A947-70E740481C1C}">
-                  <a14:useLocalDpi xmlns:a14="http://schemas.microsoft.com/office/drawing/2010/main" val="0"/>
-                </a:ext>
-              </a:extLst>
-            </a:blip>
-            <a:srcRect l="17037" t="21156" r="28573" b="41190"/>
-            <a:stretch/>
-          </p:blipFill>
-          <p:spPr bwMode="auto">
-            <a:xfrm>
-              <a:off x="13309161" y="24098022"/>
-              <a:ext cx="2641717" cy="1828800"/>
-            </a:xfrm>
-            <a:prstGeom prst="rect">
-              <a:avLst/>
-            </a:prstGeom>
-            <a:noFill/>
-            <a:effectLst/>
-            <a:extLst>
-              <a:ext uri="{909E8E84-426E-40DD-AFC4-6F175D3DCCD1}">
-                <a14:hiddenFill xmlns:a14="http://schemas.microsoft.com/office/drawing/2010/main">
-                  <a:solidFill>
-                    <a:srgbClr val="FFFFFF"/>
-                  </a:solidFill>
-                </a14:hiddenFill>
-              </a:ext>
-            </a:extLst>
-          </p:spPr>
-        </p:pic>
-        <p:sp>
-          <p:nvSpPr>
-            <p:cNvPr id="22" name="TextBox 21">
-              <a:extLst>
-                <a:ext uri="{FF2B5EF4-FFF2-40B4-BE49-F238E27FC236}">
-                  <a16:creationId xmlns:a16="http://schemas.microsoft.com/office/drawing/2014/main" id="{2609F6B6-7BCB-350C-0B81-7EAFAF6EE15C}"/>
-                </a:ext>
-              </a:extLst>
-            </p:cNvPr>
-            <p:cNvSpPr txBox="1"/>
-            <p:nvPr/>
-          </p:nvSpPr>
-          <p:spPr>
-            <a:xfrm>
-              <a:off x="12005855" y="25926822"/>
-              <a:ext cx="5215640" cy="1384995"/>
-            </a:xfrm>
-            <a:prstGeom prst="rect">
-              <a:avLst/>
-            </a:prstGeom>
-            <a:noFill/>
-          </p:spPr>
-          <p:txBody>
-            <a:bodyPr wrap="square" rtlCol="0">
-              <a:spAutoFit/>
-            </a:bodyPr>
-            <a:lstStyle/>
-            <a:p>
-              <a:pPr algn="ctr"/>
-              <a:r>
-                <a:rPr lang="en-US" sz="4800" b="1" dirty="0">
-                  <a:latin typeface="Arial" panose="020B0604020202020204" pitchFamily="34" charset="0"/>
-                  <a:cs typeface="Arial" panose="020B0604020202020204" pitchFamily="34" charset="0"/>
-                </a:rPr>
-                <a:t>Isaac Sim</a:t>
-              </a:r>
-            </a:p>
-            <a:p>
-              <a:pPr algn="ctr"/>
-              <a:r>
-                <a:rPr lang="en-US" sz="3600" dirty="0">
-                  <a:latin typeface="Arial" panose="020B0604020202020204" pitchFamily="34" charset="0"/>
-                  <a:cs typeface="Arial" panose="020B0604020202020204" pitchFamily="34" charset="0"/>
-                </a:rPr>
-                <a:t>Environment Simulation </a:t>
-              </a:r>
-            </a:p>
-          </p:txBody>
-        </p:sp>
-      </p:grpSp>
-      <p:grpSp>
-        <p:nvGrpSpPr>
-          <p:cNvPr id="1076" name="Group 1075">
-            <a:extLst>
-              <a:ext uri="{FF2B5EF4-FFF2-40B4-BE49-F238E27FC236}">
-                <a16:creationId xmlns:a16="http://schemas.microsoft.com/office/drawing/2014/main" id="{BD2F28E9-8ECE-565B-345B-EB477345E18A}"/>
-              </a:ext>
-            </a:extLst>
-          </p:cNvPr>
-          <p:cNvGrpSpPr/>
-          <p:nvPr/>
-        </p:nvGrpSpPr>
-        <p:grpSpPr>
-          <a:xfrm>
-            <a:off x="27655381" y="19021315"/>
-            <a:ext cx="3810916" cy="3174075"/>
-            <a:chOff x="12724562" y="20586923"/>
-            <a:chExt cx="3810916" cy="3174075"/>
-          </a:xfrm>
-        </p:grpSpPr>
-        <p:pic>
-          <p:nvPicPr>
-            <p:cNvPr id="3" name="Picture 2" descr="OpenCV: Que es OpenCV">
-              <a:extLst>
-                <a:ext uri="{FF2B5EF4-FFF2-40B4-BE49-F238E27FC236}">
-                  <a16:creationId xmlns:a16="http://schemas.microsoft.com/office/drawing/2014/main" id="{B4581CC9-ECF6-DBBA-7F79-DC9CDE7F5BD0}"/>
-                </a:ext>
-              </a:extLst>
-            </p:cNvPr>
-            <p:cNvPicPr>
-              <a:picLocks noChangeAspect="1" noChangeArrowheads="1"/>
-            </p:cNvPicPr>
-            <p:nvPr/>
-          </p:nvPicPr>
-          <p:blipFill rotWithShape="1">
-            <a:blip r:embed="rId23">
-              <a:extLst>
-                <a:ext uri="{28A0092B-C50C-407E-A947-70E740481C1C}">
-                  <a14:useLocalDpi xmlns:a14="http://schemas.microsoft.com/office/drawing/2010/main" val="0"/>
-                </a:ext>
-              </a:extLst>
-            </a:blip>
-            <a:srcRect b="24392"/>
-            <a:stretch/>
-          </p:blipFill>
-          <p:spPr bwMode="auto">
-            <a:xfrm>
-              <a:off x="13648897" y="20586923"/>
-              <a:ext cx="1962246" cy="1828800"/>
-            </a:xfrm>
-            <a:prstGeom prst="rect">
-              <a:avLst/>
-            </a:prstGeom>
-            <a:noFill/>
-            <a:extLst>
-              <a:ext uri="{909E8E84-426E-40DD-AFC4-6F175D3DCCD1}">
-                <a14:hiddenFill xmlns:a14="http://schemas.microsoft.com/office/drawing/2010/main">
-                  <a:solidFill>
-                    <a:srgbClr val="FFFFFF"/>
-                  </a:solidFill>
-                </a14:hiddenFill>
-              </a:ext>
-            </a:extLst>
-          </p:spPr>
-        </p:pic>
-        <p:sp>
-          <p:nvSpPr>
-            <p:cNvPr id="17" name="TextBox 16">
-              <a:extLst>
-                <a:ext uri="{FF2B5EF4-FFF2-40B4-BE49-F238E27FC236}">
-                  <a16:creationId xmlns:a16="http://schemas.microsoft.com/office/drawing/2014/main" id="{7AF09225-D0F8-3619-4957-A4D1088566D1}"/>
-                </a:ext>
-              </a:extLst>
-            </p:cNvPr>
-            <p:cNvSpPr txBox="1"/>
-            <p:nvPr/>
-          </p:nvSpPr>
-          <p:spPr>
-            <a:xfrm>
-              <a:off x="12724562" y="22376003"/>
-              <a:ext cx="3810916" cy="1384995"/>
-            </a:xfrm>
-            <a:prstGeom prst="rect">
-              <a:avLst/>
-            </a:prstGeom>
-            <a:noFill/>
-          </p:spPr>
-          <p:txBody>
-            <a:bodyPr wrap="square" rtlCol="0">
-              <a:spAutoFit/>
-            </a:bodyPr>
-            <a:lstStyle/>
-            <a:p>
-              <a:pPr algn="ctr"/>
-              <a:r>
-                <a:rPr lang="en-US" sz="4800" b="1" dirty="0">
-                  <a:latin typeface="Arial" panose="020B0604020202020204" pitchFamily="34" charset="0"/>
-                  <a:cs typeface="Arial" panose="020B0604020202020204" pitchFamily="34" charset="0"/>
-                </a:rPr>
-                <a:t>OpenCV</a:t>
-              </a:r>
-            </a:p>
-            <a:p>
-              <a:pPr algn="ctr"/>
-              <a:r>
-                <a:rPr lang="en-US" sz="3600" dirty="0">
-                  <a:latin typeface="Arial" panose="020B0604020202020204" pitchFamily="34" charset="0"/>
-                  <a:cs typeface="Arial" panose="020B0604020202020204" pitchFamily="34" charset="0"/>
-                </a:rPr>
-                <a:t>Vision Processing</a:t>
-              </a:r>
-            </a:p>
-          </p:txBody>
-        </p:sp>
-      </p:grpSp>
       <p:sp>
         <p:nvSpPr>
           <p:cNvPr id="1080" name="AutoShape 2">
@@ -8086,10 +5854,10 @@
               </a:pathLst>
             </a:custGeom>
             <a:blipFill>
-              <a:blip r:embed="rId24">
+              <a:blip r:embed="rId8">
                 <a:extLst>
                   <a:ext uri="{96DAC541-7B7A-43D3-8B79-37D633B846F1}">
-                    <asvg:svgBlip xmlns:asvg="http://schemas.microsoft.com/office/drawing/2016/SVG/main" r:embed="rId25"/>
+                    <asvg:svgBlip xmlns:asvg="http://schemas.microsoft.com/office/drawing/2016/SVG/main" r:embed="rId9"/>
                   </a:ext>
                 </a:extLst>
               </a:blip>
@@ -8676,10 +6444,10 @@
             </a:pathLst>
           </a:custGeom>
           <a:blipFill>
-            <a:blip r:embed="rId26">
+            <a:blip r:embed="rId10">
               <a:extLst>
                 <a:ext uri="{96DAC541-7B7A-43D3-8B79-37D633B846F1}">
-                  <asvg:svgBlip xmlns:asvg="http://schemas.microsoft.com/office/drawing/2016/SVG/main" r:embed="rId27"/>
+                  <asvg:svgBlip xmlns:asvg="http://schemas.microsoft.com/office/drawing/2016/SVG/main" r:embed="rId11"/>
                 </a:ext>
               </a:extLst>
             </a:blip>
@@ -9143,10 +6911,10 @@
               </a:pathLst>
             </a:custGeom>
             <a:blipFill>
-              <a:blip r:embed="rId28">
+              <a:blip r:embed="rId12">
                 <a:extLst>
                   <a:ext uri="{96DAC541-7B7A-43D3-8B79-37D633B846F1}">
-                    <asvg:svgBlip xmlns:asvg="http://schemas.microsoft.com/office/drawing/2016/SVG/main" r:embed="rId29"/>
+                    <asvg:svgBlip xmlns:asvg="http://schemas.microsoft.com/office/drawing/2016/SVG/main" r:embed="rId13"/>
                   </a:ext>
                 </a:extLst>
               </a:blip>
@@ -9164,6 +6932,2068 @@
           </p:txBody>
         </p:sp>
       </p:grpSp>
+      <p:grpSp>
+        <p:nvGrpSpPr>
+          <p:cNvPr id="1054" name="Group 1053">
+            <a:extLst>
+              <a:ext uri="{FF2B5EF4-FFF2-40B4-BE49-F238E27FC236}">
+                <a16:creationId xmlns:a16="http://schemas.microsoft.com/office/drawing/2014/main" id="{2300B355-879D-6D3E-DA31-8CEE14E4CAEE}"/>
+              </a:ext>
+            </a:extLst>
+          </p:cNvPr>
+          <p:cNvGrpSpPr/>
+          <p:nvPr/>
+        </p:nvGrpSpPr>
+        <p:grpSpPr>
+          <a:xfrm>
+            <a:off x="12420190" y="19377436"/>
+            <a:ext cx="12987999" cy="8030222"/>
+            <a:chOff x="16481916" y="18726693"/>
+            <a:chExt cx="14060046" cy="8693047"/>
+          </a:xfrm>
+        </p:grpSpPr>
+        <p:sp>
+          <p:nvSpPr>
+            <p:cNvPr id="54" name="Arrow: Bent 53">
+              <a:extLst>
+                <a:ext uri="{FF2B5EF4-FFF2-40B4-BE49-F238E27FC236}">
+                  <a16:creationId xmlns:a16="http://schemas.microsoft.com/office/drawing/2014/main" id="{C2FED081-F347-DFD9-DCBE-7500C7E2771B}"/>
+                </a:ext>
+              </a:extLst>
+            </p:cNvPr>
+            <p:cNvSpPr/>
+            <p:nvPr/>
+          </p:nvSpPr>
+          <p:spPr>
+            <a:xfrm flipV="1">
+              <a:off x="17129998" y="21244465"/>
+              <a:ext cx="1371600" cy="1371600"/>
+            </a:xfrm>
+            <a:prstGeom prst="bentArrow">
+              <a:avLst/>
+            </a:prstGeom>
+            <a:solidFill>
+              <a:schemeClr val="bg1"/>
+            </a:solidFill>
+          </p:spPr>
+          <p:style>
+            <a:lnRef idx="2">
+              <a:schemeClr val="accent1">
+                <a:shade val="15000"/>
+              </a:schemeClr>
+            </a:lnRef>
+            <a:fillRef idx="1">
+              <a:schemeClr val="accent1"/>
+            </a:fillRef>
+            <a:effectRef idx="0">
+              <a:schemeClr val="accent1"/>
+            </a:effectRef>
+            <a:fontRef idx="minor">
+              <a:schemeClr val="lt1"/>
+            </a:fontRef>
+          </p:style>
+          <p:txBody>
+            <a:bodyPr rtlCol="0" anchor="ctr"/>
+            <a:lstStyle/>
+            <a:p>
+              <a:pPr algn="ctr"/>
+              <a:endParaRPr lang="en-US" dirty="0">
+                <a:solidFill>
+                  <a:schemeClr val="tx1"/>
+                </a:solidFill>
+              </a:endParaRPr>
+            </a:p>
+          </p:txBody>
+        </p:sp>
+        <p:sp>
+          <p:nvSpPr>
+            <p:cNvPr id="55" name="Arrow: Bent 54">
+              <a:extLst>
+                <a:ext uri="{FF2B5EF4-FFF2-40B4-BE49-F238E27FC236}">
+                  <a16:creationId xmlns:a16="http://schemas.microsoft.com/office/drawing/2014/main" id="{7DEFEE5D-B530-9711-BD23-340781E7F8ED}"/>
+                </a:ext>
+              </a:extLst>
+            </p:cNvPr>
+            <p:cNvSpPr/>
+            <p:nvPr/>
+          </p:nvSpPr>
+          <p:spPr>
+            <a:xfrm flipV="1">
+              <a:off x="19148929" y="23300815"/>
+              <a:ext cx="1371600" cy="1371600"/>
+            </a:xfrm>
+            <a:prstGeom prst="bentArrow">
+              <a:avLst/>
+            </a:prstGeom>
+            <a:solidFill>
+              <a:schemeClr val="bg1"/>
+            </a:solidFill>
+          </p:spPr>
+          <p:style>
+            <a:lnRef idx="2">
+              <a:schemeClr val="accent1">
+                <a:shade val="15000"/>
+              </a:schemeClr>
+            </a:lnRef>
+            <a:fillRef idx="1">
+              <a:schemeClr val="accent1"/>
+            </a:fillRef>
+            <a:effectRef idx="0">
+              <a:schemeClr val="accent1"/>
+            </a:effectRef>
+            <a:fontRef idx="minor">
+              <a:schemeClr val="lt1"/>
+            </a:fontRef>
+          </p:style>
+          <p:txBody>
+            <a:bodyPr rtlCol="0" anchor="ctr"/>
+            <a:lstStyle/>
+            <a:p>
+              <a:pPr algn="ctr"/>
+              <a:endParaRPr lang="en-US" dirty="0">
+                <a:solidFill>
+                  <a:schemeClr val="tx1"/>
+                </a:solidFill>
+              </a:endParaRPr>
+            </a:p>
+          </p:txBody>
+        </p:sp>
+        <p:sp>
+          <p:nvSpPr>
+            <p:cNvPr id="56" name="Arrow: Bent 55">
+              <a:extLst>
+                <a:ext uri="{FF2B5EF4-FFF2-40B4-BE49-F238E27FC236}">
+                  <a16:creationId xmlns:a16="http://schemas.microsoft.com/office/drawing/2014/main" id="{6C5597B8-0C29-8187-5079-E9F4188A2A2D}"/>
+                </a:ext>
+              </a:extLst>
+            </p:cNvPr>
+            <p:cNvSpPr/>
+            <p:nvPr/>
+          </p:nvSpPr>
+          <p:spPr>
+            <a:xfrm flipV="1">
+              <a:off x="21168987" y="25360337"/>
+              <a:ext cx="1371600" cy="1371600"/>
+            </a:xfrm>
+            <a:prstGeom prst="bentArrow">
+              <a:avLst/>
+            </a:prstGeom>
+            <a:solidFill>
+              <a:schemeClr val="bg1"/>
+            </a:solidFill>
+          </p:spPr>
+          <p:style>
+            <a:lnRef idx="2">
+              <a:schemeClr val="accent1">
+                <a:shade val="15000"/>
+              </a:schemeClr>
+            </a:lnRef>
+            <a:fillRef idx="1">
+              <a:schemeClr val="accent1"/>
+            </a:fillRef>
+            <a:effectRef idx="0">
+              <a:schemeClr val="accent1"/>
+            </a:effectRef>
+            <a:fontRef idx="minor">
+              <a:schemeClr val="lt1"/>
+            </a:fontRef>
+          </p:style>
+          <p:txBody>
+            <a:bodyPr rtlCol="0" anchor="ctr"/>
+            <a:lstStyle/>
+            <a:p>
+              <a:pPr algn="ctr"/>
+              <a:endParaRPr lang="en-US" dirty="0">
+                <a:solidFill>
+                  <a:schemeClr val="tx1"/>
+                </a:solidFill>
+              </a:endParaRPr>
+            </a:p>
+          </p:txBody>
+        </p:sp>
+        <p:sp>
+          <p:nvSpPr>
+            <p:cNvPr id="1058" name="TextBox 37">
+              <a:extLst>
+                <a:ext uri="{FF2B5EF4-FFF2-40B4-BE49-F238E27FC236}">
+                  <a16:creationId xmlns:a16="http://schemas.microsoft.com/office/drawing/2014/main" id="{77C12DC2-E7A8-A82E-E019-E20F30D30C21}"/>
+                </a:ext>
+              </a:extLst>
+            </p:cNvPr>
+            <p:cNvSpPr txBox="1"/>
+            <p:nvPr/>
+          </p:nvSpPr>
+          <p:spPr>
+            <a:xfrm>
+              <a:off x="16701708" y="19792107"/>
+              <a:ext cx="3273230" cy="179162"/>
+            </a:xfrm>
+            <a:prstGeom prst="rect">
+              <a:avLst/>
+            </a:prstGeom>
+          </p:spPr>
+          <p:txBody>
+            <a:bodyPr lIns="0" tIns="0" rIns="0" bIns="0" rtlCol="0" anchor="t">
+              <a:spAutoFit/>
+            </a:bodyPr>
+            <a:lstStyle/>
+            <a:p>
+              <a:pPr algn="l">
+                <a:lnSpc>
+                  <a:spcPts val="1299"/>
+                </a:lnSpc>
+              </a:pPr>
+              <a:endParaRPr lang="en-US" sz="1299" b="1" dirty="0">
+                <a:solidFill>
+                  <a:srgbClr val="FFFFFF"/>
+                </a:solidFill>
+                <a:latin typeface="Arial" panose="020B0604020202020204" pitchFamily="34" charset="0"/>
+                <a:ea typeface="Kollektif Bold"/>
+                <a:cs typeface="Arial" panose="020B0604020202020204" pitchFamily="34" charset="0"/>
+                <a:sym typeface="Kollektif Bold"/>
+              </a:endParaRPr>
+            </a:p>
+          </p:txBody>
+        </p:sp>
+        <p:sp>
+          <p:nvSpPr>
+            <p:cNvPr id="30" name="Freeform 3">
+              <a:extLst>
+                <a:ext uri="{FF2B5EF4-FFF2-40B4-BE49-F238E27FC236}">
+                  <a16:creationId xmlns:a16="http://schemas.microsoft.com/office/drawing/2014/main" id="{C26289E9-D6A9-D1CB-4380-4C1EDEA33C4E}"/>
+                </a:ext>
+              </a:extLst>
+            </p:cNvPr>
+            <p:cNvSpPr/>
+            <p:nvPr/>
+          </p:nvSpPr>
+          <p:spPr>
+            <a:xfrm>
+              <a:off x="18501598" y="21472015"/>
+              <a:ext cx="7315200" cy="1828800"/>
+            </a:xfrm>
+            <a:custGeom>
+              <a:avLst/>
+              <a:gdLst/>
+              <a:ahLst/>
+              <a:cxnLst/>
+              <a:rect l="l" t="t" r="r" b="b"/>
+              <a:pathLst>
+                <a:path w="8950884" h="2311400">
+                  <a:moveTo>
+                    <a:pt x="8646084" y="0"/>
+                  </a:moveTo>
+                  <a:lnTo>
+                    <a:pt x="304800" y="0"/>
+                  </a:lnTo>
+                  <a:cubicBezTo>
+                    <a:pt x="135890" y="0"/>
+                    <a:pt x="0" y="135890"/>
+                    <a:pt x="0" y="304800"/>
+                  </a:cubicBezTo>
+                  <a:lnTo>
+                    <a:pt x="0" y="2006600"/>
+                  </a:lnTo>
+                  <a:cubicBezTo>
+                    <a:pt x="0" y="2175510"/>
+                    <a:pt x="135890" y="2311400"/>
+                    <a:pt x="304800" y="2311400"/>
+                  </a:cubicBezTo>
+                  <a:lnTo>
+                    <a:pt x="8646084" y="2311400"/>
+                  </a:lnTo>
+                  <a:cubicBezTo>
+                    <a:pt x="8814994" y="2311400"/>
+                    <a:pt x="8950884" y="2175510"/>
+                    <a:pt x="8950884" y="2006600"/>
+                  </a:cubicBezTo>
+                  <a:lnTo>
+                    <a:pt x="8950884" y="304800"/>
+                  </a:lnTo>
+                  <a:cubicBezTo>
+                    <a:pt x="8950884" y="135890"/>
+                    <a:pt x="8814994" y="0"/>
+                    <a:pt x="8646084" y="0"/>
+                  </a:cubicBezTo>
+                  <a:close/>
+                </a:path>
+              </a:pathLst>
+            </a:custGeom>
+            <a:gradFill flip="none" rotWithShape="1">
+              <a:gsLst>
+                <a:gs pos="0">
+                  <a:schemeClr val="accent4">
+                    <a:lumMod val="5000"/>
+                    <a:lumOff val="95000"/>
+                  </a:schemeClr>
+                </a:gs>
+                <a:gs pos="74000">
+                  <a:schemeClr val="accent4">
+                    <a:lumMod val="45000"/>
+                    <a:lumOff val="55000"/>
+                  </a:schemeClr>
+                </a:gs>
+                <a:gs pos="83000">
+                  <a:schemeClr val="accent4">
+                    <a:lumMod val="45000"/>
+                    <a:lumOff val="55000"/>
+                  </a:schemeClr>
+                </a:gs>
+                <a:gs pos="100000">
+                  <a:schemeClr val="accent4">
+                    <a:lumMod val="30000"/>
+                    <a:lumOff val="70000"/>
+                  </a:schemeClr>
+                </a:gs>
+              </a:gsLst>
+              <a:lin ang="5400000" scaled="1"/>
+              <a:tileRect/>
+            </a:gradFill>
+            <a:ln>
+              <a:solidFill>
+                <a:schemeClr val="accent1">
+                  <a:shade val="15000"/>
+                </a:schemeClr>
+              </a:solidFill>
+            </a:ln>
+          </p:spPr>
+          <p:txBody>
+            <a:bodyPr lIns="228600" tIns="182880" rIns="228600" bIns="182880" anchor="ctr" anchorCtr="0"/>
+            <a:lstStyle/>
+            <a:p>
+              <a:r>
+                <a:rPr lang="en-US" sz="2800" b="1" dirty="0">
+                  <a:latin typeface="Arial" panose="020B0604020202020204" pitchFamily="34" charset="0"/>
+                  <a:cs typeface="Arial" panose="020B0604020202020204" pitchFamily="34" charset="0"/>
+                </a:rPr>
+                <a:t>Virtual Environment Construction</a:t>
+              </a:r>
+            </a:p>
+            <a:p>
+              <a:pPr marL="342900" indent="-342900">
+                <a:buFont typeface="Arial" panose="020B0604020202020204" pitchFamily="34" charset="0"/>
+                <a:buChar char="•"/>
+              </a:pPr>
+              <a:r>
+                <a:rPr lang="en-US" sz="2000" dirty="0">
+                  <a:latin typeface="Arial" panose="020B0604020202020204" pitchFamily="34" charset="0"/>
+                  <a:cs typeface="Arial" panose="020B0604020202020204" pitchFamily="34" charset="0"/>
+                </a:rPr>
+                <a:t>Isaac Sim creates digital twin of workspace</a:t>
+              </a:r>
+            </a:p>
+            <a:p>
+              <a:pPr marL="342900" indent="-342900">
+                <a:buFont typeface="Arial" panose="020B0604020202020204" pitchFamily="34" charset="0"/>
+                <a:buChar char="•"/>
+              </a:pPr>
+              <a:r>
+                <a:rPr lang="en-US" sz="2000" dirty="0">
+                  <a:latin typeface="Arial" panose="020B0604020202020204" pitchFamily="34" charset="0"/>
+                  <a:cs typeface="Arial" panose="020B0604020202020204" pitchFamily="34" charset="0"/>
+                </a:rPr>
+                <a:t>Real-time task planning and optimization</a:t>
+              </a:r>
+            </a:p>
+            <a:p>
+              <a:pPr marL="342900" indent="-342900">
+                <a:buFont typeface="Arial" panose="020B0604020202020204" pitchFamily="34" charset="0"/>
+                <a:buChar char="•"/>
+              </a:pPr>
+              <a:r>
+                <a:rPr lang="en-US" sz="2000" dirty="0">
+                  <a:latin typeface="Arial" panose="020B0604020202020204" pitchFamily="34" charset="0"/>
+                  <a:cs typeface="Arial" panose="020B0604020202020204" pitchFamily="34" charset="0"/>
+                </a:rPr>
+                <a:t>Continuous safety monitoring and validation</a:t>
+              </a:r>
+            </a:p>
+          </p:txBody>
+        </p:sp>
+        <p:sp>
+          <p:nvSpPr>
+            <p:cNvPr id="31" name="Freeform 11">
+              <a:extLst>
+                <a:ext uri="{FF2B5EF4-FFF2-40B4-BE49-F238E27FC236}">
+                  <a16:creationId xmlns:a16="http://schemas.microsoft.com/office/drawing/2014/main" id="{4A49F872-3489-9EB9-94CE-23B0F699D382}"/>
+                </a:ext>
+              </a:extLst>
+            </p:cNvPr>
+            <p:cNvSpPr/>
+            <p:nvPr/>
+          </p:nvSpPr>
+          <p:spPr>
+            <a:xfrm>
+              <a:off x="25130998" y="20787721"/>
+              <a:ext cx="1371600" cy="1371600"/>
+            </a:xfrm>
+            <a:custGeom>
+              <a:avLst/>
+              <a:gdLst/>
+              <a:ahLst/>
+              <a:cxnLst/>
+              <a:rect l="l" t="t" r="r" b="b"/>
+              <a:pathLst>
+                <a:path w="6350000" h="6350000">
+                  <a:moveTo>
+                    <a:pt x="3175000" y="0"/>
+                  </a:moveTo>
+                  <a:cubicBezTo>
+                    <a:pt x="1421496" y="0"/>
+                    <a:pt x="0" y="1421496"/>
+                    <a:pt x="0" y="3175000"/>
+                  </a:cubicBezTo>
+                  <a:cubicBezTo>
+                    <a:pt x="0" y="4928504"/>
+                    <a:pt x="1421496" y="6350000"/>
+                    <a:pt x="3175000" y="6350000"/>
+                  </a:cubicBezTo>
+                  <a:cubicBezTo>
+                    <a:pt x="4928504" y="6350000"/>
+                    <a:pt x="6350000" y="4928504"/>
+                    <a:pt x="6350000" y="3175000"/>
+                  </a:cubicBezTo>
+                  <a:cubicBezTo>
+                    <a:pt x="6350000" y="1421496"/>
+                    <a:pt x="4928504" y="0"/>
+                    <a:pt x="3175000" y="0"/>
+                  </a:cubicBezTo>
+                  <a:close/>
+                </a:path>
+              </a:pathLst>
+            </a:custGeom>
+            <a:gradFill flip="none" rotWithShape="1">
+              <a:gsLst>
+                <a:gs pos="0">
+                  <a:schemeClr val="accent4">
+                    <a:lumMod val="0"/>
+                    <a:lumOff val="100000"/>
+                  </a:schemeClr>
+                </a:gs>
+                <a:gs pos="35000">
+                  <a:schemeClr val="accent4">
+                    <a:lumMod val="0"/>
+                    <a:lumOff val="100000"/>
+                  </a:schemeClr>
+                </a:gs>
+                <a:gs pos="100000">
+                  <a:schemeClr val="accent4">
+                    <a:lumMod val="100000"/>
+                  </a:schemeClr>
+                </a:gs>
+              </a:gsLst>
+              <a:path path="circle">
+                <a:fillToRect l="50000" t="-80000" r="50000" b="180000"/>
+              </a:path>
+              <a:tileRect/>
+            </a:gradFill>
+          </p:spPr>
+          <p:txBody>
+            <a:bodyPr/>
+            <a:lstStyle/>
+            <a:p>
+              <a:endParaRPr lang="en-US"/>
+            </a:p>
+          </p:txBody>
+        </p:sp>
+        <p:sp>
+          <p:nvSpPr>
+            <p:cNvPr id="33" name="Freeform 19">
+              <a:extLst>
+                <a:ext uri="{FF2B5EF4-FFF2-40B4-BE49-F238E27FC236}">
+                  <a16:creationId xmlns:a16="http://schemas.microsoft.com/office/drawing/2014/main" id="{EAD138FB-AE5F-0E7E-C0FD-675953353993}"/>
+                </a:ext>
+              </a:extLst>
+            </p:cNvPr>
+            <p:cNvSpPr/>
+            <p:nvPr/>
+          </p:nvSpPr>
+          <p:spPr>
+            <a:xfrm>
+              <a:off x="25359598" y="21015865"/>
+              <a:ext cx="914400" cy="914400"/>
+            </a:xfrm>
+            <a:custGeom>
+              <a:avLst/>
+              <a:gdLst/>
+              <a:ahLst/>
+              <a:cxnLst/>
+              <a:rect l="l" t="t" r="r" b="b"/>
+              <a:pathLst>
+                <a:path w="6350000" h="6350000">
+                  <a:moveTo>
+                    <a:pt x="3175000" y="0"/>
+                  </a:moveTo>
+                  <a:cubicBezTo>
+                    <a:pt x="1421496" y="0"/>
+                    <a:pt x="0" y="1421496"/>
+                    <a:pt x="0" y="3175000"/>
+                  </a:cubicBezTo>
+                  <a:cubicBezTo>
+                    <a:pt x="0" y="4928504"/>
+                    <a:pt x="1421496" y="6350000"/>
+                    <a:pt x="3175000" y="6350000"/>
+                  </a:cubicBezTo>
+                  <a:cubicBezTo>
+                    <a:pt x="4928504" y="6350000"/>
+                    <a:pt x="6350000" y="4928504"/>
+                    <a:pt x="6350000" y="3175000"/>
+                  </a:cubicBezTo>
+                  <a:cubicBezTo>
+                    <a:pt x="6350000" y="1421496"/>
+                    <a:pt x="4928504" y="0"/>
+                    <a:pt x="3175000" y="0"/>
+                  </a:cubicBezTo>
+                  <a:close/>
+                </a:path>
+              </a:pathLst>
+            </a:custGeom>
+            <a:solidFill>
+              <a:srgbClr val="FFFFFF"/>
+            </a:solidFill>
+          </p:spPr>
+          <p:txBody>
+            <a:bodyPr/>
+            <a:lstStyle/>
+            <a:p>
+              <a:endParaRPr lang="en-US" dirty="0"/>
+            </a:p>
+          </p:txBody>
+        </p:sp>
+        <p:sp>
+          <p:nvSpPr>
+            <p:cNvPr id="35" name="Freeform 3">
+              <a:extLst>
+                <a:ext uri="{FF2B5EF4-FFF2-40B4-BE49-F238E27FC236}">
+                  <a16:creationId xmlns:a16="http://schemas.microsoft.com/office/drawing/2014/main" id="{6FCCB834-5B37-3580-B606-3DD6CEF33B78}"/>
+                </a:ext>
+              </a:extLst>
+            </p:cNvPr>
+            <p:cNvSpPr/>
+            <p:nvPr/>
+          </p:nvSpPr>
+          <p:spPr>
+            <a:xfrm>
+              <a:off x="20521280" y="23533043"/>
+              <a:ext cx="7315200" cy="1828800"/>
+            </a:xfrm>
+            <a:custGeom>
+              <a:avLst/>
+              <a:gdLst/>
+              <a:ahLst/>
+              <a:cxnLst/>
+              <a:rect l="l" t="t" r="r" b="b"/>
+              <a:pathLst>
+                <a:path w="8950884" h="2311400">
+                  <a:moveTo>
+                    <a:pt x="8646084" y="0"/>
+                  </a:moveTo>
+                  <a:lnTo>
+                    <a:pt x="304800" y="0"/>
+                  </a:lnTo>
+                  <a:cubicBezTo>
+                    <a:pt x="135890" y="0"/>
+                    <a:pt x="0" y="135890"/>
+                    <a:pt x="0" y="304800"/>
+                  </a:cubicBezTo>
+                  <a:lnTo>
+                    <a:pt x="0" y="2006600"/>
+                  </a:lnTo>
+                  <a:cubicBezTo>
+                    <a:pt x="0" y="2175510"/>
+                    <a:pt x="135890" y="2311400"/>
+                    <a:pt x="304800" y="2311400"/>
+                  </a:cubicBezTo>
+                  <a:lnTo>
+                    <a:pt x="8646084" y="2311400"/>
+                  </a:lnTo>
+                  <a:cubicBezTo>
+                    <a:pt x="8814994" y="2311400"/>
+                    <a:pt x="8950884" y="2175510"/>
+                    <a:pt x="8950884" y="2006600"/>
+                  </a:cubicBezTo>
+                  <a:lnTo>
+                    <a:pt x="8950884" y="304800"/>
+                  </a:lnTo>
+                  <a:cubicBezTo>
+                    <a:pt x="8950884" y="135890"/>
+                    <a:pt x="8814994" y="0"/>
+                    <a:pt x="8646084" y="0"/>
+                  </a:cubicBezTo>
+                  <a:close/>
+                </a:path>
+              </a:pathLst>
+            </a:custGeom>
+            <a:gradFill flip="none" rotWithShape="1">
+              <a:gsLst>
+                <a:gs pos="0">
+                  <a:schemeClr val="accent6">
+                    <a:lumMod val="5000"/>
+                    <a:lumOff val="95000"/>
+                  </a:schemeClr>
+                </a:gs>
+                <a:gs pos="74000">
+                  <a:schemeClr val="accent6">
+                    <a:lumMod val="45000"/>
+                    <a:lumOff val="55000"/>
+                  </a:schemeClr>
+                </a:gs>
+                <a:gs pos="83000">
+                  <a:schemeClr val="accent6">
+                    <a:lumMod val="45000"/>
+                    <a:lumOff val="55000"/>
+                  </a:schemeClr>
+                </a:gs>
+                <a:gs pos="100000">
+                  <a:schemeClr val="accent6">
+                    <a:lumMod val="30000"/>
+                    <a:lumOff val="70000"/>
+                  </a:schemeClr>
+                </a:gs>
+              </a:gsLst>
+              <a:lin ang="5400000" scaled="1"/>
+              <a:tileRect/>
+            </a:gradFill>
+            <a:ln>
+              <a:solidFill>
+                <a:schemeClr val="accent1">
+                  <a:shade val="15000"/>
+                </a:schemeClr>
+              </a:solidFill>
+            </a:ln>
+          </p:spPr>
+          <p:txBody>
+            <a:bodyPr lIns="228600" tIns="182880" rIns="228600" bIns="182880" anchor="ctr" anchorCtr="0"/>
+            <a:lstStyle/>
+            <a:p>
+              <a:r>
+                <a:rPr lang="en-US" sz="2800" b="1" dirty="0">
+                  <a:latin typeface="Arial" panose="020B0604020202020204" pitchFamily="34" charset="0"/>
+                  <a:cs typeface="Arial" panose="020B0604020202020204" pitchFamily="34" charset="0"/>
+                </a:rPr>
+                <a:t>Collaborative Task Execution</a:t>
+              </a:r>
+            </a:p>
+            <a:p>
+              <a:pPr marL="342900" indent="-342900">
+                <a:buFont typeface="Arial" panose="020B0604020202020204" pitchFamily="34" charset="0"/>
+                <a:buChar char="•"/>
+              </a:pPr>
+              <a:r>
+                <a:rPr lang="en-US" sz="2000" dirty="0">
+                  <a:latin typeface="Arial" panose="020B0604020202020204" pitchFamily="34" charset="0"/>
+                  <a:cs typeface="Arial" panose="020B0604020202020204" pitchFamily="34" charset="0"/>
+                </a:rPr>
+                <a:t>Robot coordinates with human actions</a:t>
+              </a:r>
+            </a:p>
+            <a:p>
+              <a:pPr marL="342900" indent="-342900">
+                <a:buFont typeface="Arial" panose="020B0604020202020204" pitchFamily="34" charset="0"/>
+                <a:buChar char="•"/>
+              </a:pPr>
+              <a:r>
+                <a:rPr lang="en-US" sz="2000" dirty="0">
+                  <a:latin typeface="Arial" panose="020B0604020202020204" pitchFamily="34" charset="0"/>
+                  <a:cs typeface="Arial" panose="020B0604020202020204" pitchFamily="34" charset="0"/>
+                </a:rPr>
+                <a:t>Dynamic workspace management</a:t>
+              </a:r>
+            </a:p>
+            <a:p>
+              <a:pPr marL="342900" indent="-342900">
+                <a:buFont typeface="Arial" panose="020B0604020202020204" pitchFamily="34" charset="0"/>
+                <a:buChar char="•"/>
+              </a:pPr>
+              <a:r>
+                <a:rPr lang="en-US" sz="2000" dirty="0">
+                  <a:latin typeface="Arial" panose="020B0604020202020204" pitchFamily="34" charset="0"/>
+                  <a:cs typeface="Arial" panose="020B0604020202020204" pitchFamily="34" charset="0"/>
+                </a:rPr>
+                <a:t>Real-time task adaptation</a:t>
+              </a:r>
+            </a:p>
+          </p:txBody>
+        </p:sp>
+        <p:sp>
+          <p:nvSpPr>
+            <p:cNvPr id="36" name="Freeform 11">
+              <a:extLst>
+                <a:ext uri="{FF2B5EF4-FFF2-40B4-BE49-F238E27FC236}">
+                  <a16:creationId xmlns:a16="http://schemas.microsoft.com/office/drawing/2014/main" id="{65B44EF3-C9AA-EF24-62AC-4F3C0B2F55F7}"/>
+                </a:ext>
+              </a:extLst>
+            </p:cNvPr>
+            <p:cNvSpPr/>
+            <p:nvPr/>
+          </p:nvSpPr>
+          <p:spPr>
+            <a:xfrm>
+              <a:off x="27150680" y="22848749"/>
+              <a:ext cx="1371600" cy="1371600"/>
+            </a:xfrm>
+            <a:custGeom>
+              <a:avLst/>
+              <a:gdLst/>
+              <a:ahLst/>
+              <a:cxnLst/>
+              <a:rect l="l" t="t" r="r" b="b"/>
+              <a:pathLst>
+                <a:path w="6350000" h="6350000">
+                  <a:moveTo>
+                    <a:pt x="3175000" y="0"/>
+                  </a:moveTo>
+                  <a:cubicBezTo>
+                    <a:pt x="1421496" y="0"/>
+                    <a:pt x="0" y="1421496"/>
+                    <a:pt x="0" y="3175000"/>
+                  </a:cubicBezTo>
+                  <a:cubicBezTo>
+                    <a:pt x="0" y="4928504"/>
+                    <a:pt x="1421496" y="6350000"/>
+                    <a:pt x="3175000" y="6350000"/>
+                  </a:cubicBezTo>
+                  <a:cubicBezTo>
+                    <a:pt x="4928504" y="6350000"/>
+                    <a:pt x="6350000" y="4928504"/>
+                    <a:pt x="6350000" y="3175000"/>
+                  </a:cubicBezTo>
+                  <a:cubicBezTo>
+                    <a:pt x="6350000" y="1421496"/>
+                    <a:pt x="4928504" y="0"/>
+                    <a:pt x="3175000" y="0"/>
+                  </a:cubicBezTo>
+                  <a:close/>
+                </a:path>
+              </a:pathLst>
+            </a:custGeom>
+            <a:gradFill flip="none" rotWithShape="1">
+              <a:gsLst>
+                <a:gs pos="0">
+                  <a:schemeClr val="accent6">
+                    <a:lumMod val="0"/>
+                    <a:lumOff val="100000"/>
+                  </a:schemeClr>
+                </a:gs>
+                <a:gs pos="35000">
+                  <a:schemeClr val="accent6">
+                    <a:lumMod val="0"/>
+                    <a:lumOff val="100000"/>
+                  </a:schemeClr>
+                </a:gs>
+                <a:gs pos="100000">
+                  <a:schemeClr val="accent6">
+                    <a:lumMod val="100000"/>
+                  </a:schemeClr>
+                </a:gs>
+              </a:gsLst>
+              <a:path path="circle">
+                <a:fillToRect l="50000" t="-80000" r="50000" b="180000"/>
+              </a:path>
+              <a:tileRect/>
+            </a:gradFill>
+          </p:spPr>
+          <p:txBody>
+            <a:bodyPr/>
+            <a:lstStyle/>
+            <a:p>
+              <a:endParaRPr lang="en-US"/>
+            </a:p>
+          </p:txBody>
+        </p:sp>
+        <p:sp>
+          <p:nvSpPr>
+            <p:cNvPr id="37" name="Freeform 19">
+              <a:extLst>
+                <a:ext uri="{FF2B5EF4-FFF2-40B4-BE49-F238E27FC236}">
+                  <a16:creationId xmlns:a16="http://schemas.microsoft.com/office/drawing/2014/main" id="{A1459AEE-F8B6-BF69-68D4-F3379B2FAB4D}"/>
+                </a:ext>
+              </a:extLst>
+            </p:cNvPr>
+            <p:cNvSpPr/>
+            <p:nvPr/>
+          </p:nvSpPr>
+          <p:spPr>
+            <a:xfrm>
+              <a:off x="27379280" y="23076893"/>
+              <a:ext cx="914400" cy="914400"/>
+            </a:xfrm>
+            <a:custGeom>
+              <a:avLst/>
+              <a:gdLst/>
+              <a:ahLst/>
+              <a:cxnLst/>
+              <a:rect l="l" t="t" r="r" b="b"/>
+              <a:pathLst>
+                <a:path w="6350000" h="6350000">
+                  <a:moveTo>
+                    <a:pt x="3175000" y="0"/>
+                  </a:moveTo>
+                  <a:cubicBezTo>
+                    <a:pt x="1421496" y="0"/>
+                    <a:pt x="0" y="1421496"/>
+                    <a:pt x="0" y="3175000"/>
+                  </a:cubicBezTo>
+                  <a:cubicBezTo>
+                    <a:pt x="0" y="4928504"/>
+                    <a:pt x="1421496" y="6350000"/>
+                    <a:pt x="3175000" y="6350000"/>
+                  </a:cubicBezTo>
+                  <a:cubicBezTo>
+                    <a:pt x="4928504" y="6350000"/>
+                    <a:pt x="6350000" y="4928504"/>
+                    <a:pt x="6350000" y="3175000"/>
+                  </a:cubicBezTo>
+                  <a:cubicBezTo>
+                    <a:pt x="6350000" y="1421496"/>
+                    <a:pt x="4928504" y="0"/>
+                    <a:pt x="3175000" y="0"/>
+                  </a:cubicBezTo>
+                  <a:close/>
+                </a:path>
+              </a:pathLst>
+            </a:custGeom>
+            <a:solidFill>
+              <a:srgbClr val="FFFFFF"/>
+            </a:solidFill>
+          </p:spPr>
+          <p:txBody>
+            <a:bodyPr/>
+            <a:lstStyle/>
+            <a:p>
+              <a:endParaRPr lang="en-US" dirty="0"/>
+            </a:p>
+          </p:txBody>
+        </p:sp>
+        <p:sp>
+          <p:nvSpPr>
+            <p:cNvPr id="43" name="Freeform 3">
+              <a:extLst>
+                <a:ext uri="{FF2B5EF4-FFF2-40B4-BE49-F238E27FC236}">
+                  <a16:creationId xmlns:a16="http://schemas.microsoft.com/office/drawing/2014/main" id="{BABD4DD8-533B-C068-4E8D-4A2F5FE0F8B9}"/>
+                </a:ext>
+              </a:extLst>
+            </p:cNvPr>
+            <p:cNvSpPr/>
+            <p:nvPr/>
+          </p:nvSpPr>
+          <p:spPr>
+            <a:xfrm>
+              <a:off x="22540962" y="25590940"/>
+              <a:ext cx="7315200" cy="1828800"/>
+            </a:xfrm>
+            <a:custGeom>
+              <a:avLst/>
+              <a:gdLst/>
+              <a:ahLst/>
+              <a:cxnLst/>
+              <a:rect l="l" t="t" r="r" b="b"/>
+              <a:pathLst>
+                <a:path w="8950884" h="2311400">
+                  <a:moveTo>
+                    <a:pt x="8646084" y="0"/>
+                  </a:moveTo>
+                  <a:lnTo>
+                    <a:pt x="304800" y="0"/>
+                  </a:lnTo>
+                  <a:cubicBezTo>
+                    <a:pt x="135890" y="0"/>
+                    <a:pt x="0" y="135890"/>
+                    <a:pt x="0" y="304800"/>
+                  </a:cubicBezTo>
+                  <a:lnTo>
+                    <a:pt x="0" y="2006600"/>
+                  </a:lnTo>
+                  <a:cubicBezTo>
+                    <a:pt x="0" y="2175510"/>
+                    <a:pt x="135890" y="2311400"/>
+                    <a:pt x="304800" y="2311400"/>
+                  </a:cubicBezTo>
+                  <a:lnTo>
+                    <a:pt x="8646084" y="2311400"/>
+                  </a:lnTo>
+                  <a:cubicBezTo>
+                    <a:pt x="8814994" y="2311400"/>
+                    <a:pt x="8950884" y="2175510"/>
+                    <a:pt x="8950884" y="2006600"/>
+                  </a:cubicBezTo>
+                  <a:lnTo>
+                    <a:pt x="8950884" y="304800"/>
+                  </a:lnTo>
+                  <a:cubicBezTo>
+                    <a:pt x="8950884" y="135890"/>
+                    <a:pt x="8814994" y="0"/>
+                    <a:pt x="8646084" y="0"/>
+                  </a:cubicBezTo>
+                  <a:close/>
+                </a:path>
+              </a:pathLst>
+            </a:custGeom>
+            <a:gradFill flip="none" rotWithShape="1">
+              <a:gsLst>
+                <a:gs pos="0">
+                  <a:schemeClr val="accent5">
+                    <a:lumMod val="5000"/>
+                    <a:lumOff val="95000"/>
+                  </a:schemeClr>
+                </a:gs>
+                <a:gs pos="74000">
+                  <a:schemeClr val="accent5">
+                    <a:lumMod val="45000"/>
+                    <a:lumOff val="55000"/>
+                  </a:schemeClr>
+                </a:gs>
+                <a:gs pos="83000">
+                  <a:schemeClr val="accent5">
+                    <a:lumMod val="45000"/>
+                    <a:lumOff val="55000"/>
+                  </a:schemeClr>
+                </a:gs>
+                <a:gs pos="100000">
+                  <a:schemeClr val="accent5">
+                    <a:lumMod val="30000"/>
+                    <a:lumOff val="70000"/>
+                  </a:schemeClr>
+                </a:gs>
+              </a:gsLst>
+              <a:lin ang="5400000" scaled="1"/>
+              <a:tileRect/>
+            </a:gradFill>
+            <a:ln>
+              <a:solidFill>
+                <a:schemeClr val="accent1">
+                  <a:shade val="15000"/>
+                </a:schemeClr>
+              </a:solidFill>
+            </a:ln>
+          </p:spPr>
+          <p:txBody>
+            <a:bodyPr lIns="228600" tIns="182880" rIns="228600" bIns="182880" anchor="ctr" anchorCtr="0"/>
+            <a:lstStyle/>
+            <a:p>
+              <a:r>
+                <a:rPr lang="en-US" sz="2800" b="1" dirty="0">
+                  <a:latin typeface="Arial" panose="020B0604020202020204" pitchFamily="34" charset="0"/>
+                  <a:cs typeface="Arial" panose="020B0604020202020204" pitchFamily="34" charset="0"/>
+                </a:rPr>
+                <a:t>Cybernetic Feedback Loops</a:t>
+              </a:r>
+            </a:p>
+            <a:p>
+              <a:pPr marL="342900" indent="-342900">
+                <a:buFont typeface="Arial" panose="020B0604020202020204" pitchFamily="34" charset="0"/>
+                <a:buChar char="•"/>
+              </a:pPr>
+              <a:r>
+                <a:rPr lang="en-US" sz="2000" dirty="0">
+                  <a:latin typeface="Arial" panose="020B0604020202020204" pitchFamily="34" charset="0"/>
+                  <a:cs typeface="Arial" panose="020B0604020202020204" pitchFamily="34" charset="0"/>
+                </a:rPr>
+                <a:t>Robot learning from task outcomes</a:t>
+              </a:r>
+            </a:p>
+            <a:p>
+              <a:pPr marL="342900" indent="-342900">
+                <a:buFont typeface="Arial" panose="020B0604020202020204" pitchFamily="34" charset="0"/>
+                <a:buChar char="•"/>
+              </a:pPr>
+              <a:r>
+                <a:rPr lang="en-US" sz="2000" dirty="0">
+                  <a:latin typeface="Arial" panose="020B0604020202020204" pitchFamily="34" charset="0"/>
+                  <a:cs typeface="Arial" panose="020B0604020202020204" pitchFamily="34" charset="0"/>
+                </a:rPr>
+                <a:t>Human adaptation through visual feedback</a:t>
+              </a:r>
+            </a:p>
+            <a:p>
+              <a:pPr marL="342900" indent="-342900">
+                <a:buFont typeface="Arial" panose="020B0604020202020204" pitchFamily="34" charset="0"/>
+                <a:buChar char="•"/>
+              </a:pPr>
+              <a:r>
+                <a:rPr lang="en-US" sz="2000" dirty="0">
+                  <a:latin typeface="Arial" panose="020B0604020202020204" pitchFamily="34" charset="0"/>
+                  <a:cs typeface="Arial" panose="020B0604020202020204" pitchFamily="34" charset="0"/>
+                </a:rPr>
+                <a:t>Continuous system optimization</a:t>
+              </a:r>
+            </a:p>
+          </p:txBody>
+        </p:sp>
+        <p:sp>
+          <p:nvSpPr>
+            <p:cNvPr id="44" name="Freeform 11">
+              <a:extLst>
+                <a:ext uri="{FF2B5EF4-FFF2-40B4-BE49-F238E27FC236}">
+                  <a16:creationId xmlns:a16="http://schemas.microsoft.com/office/drawing/2014/main" id="{170A8670-E59B-8E8E-B61A-21ABD3A784E1}"/>
+                </a:ext>
+              </a:extLst>
+            </p:cNvPr>
+            <p:cNvSpPr/>
+            <p:nvPr/>
+          </p:nvSpPr>
+          <p:spPr>
+            <a:xfrm>
+              <a:off x="29170362" y="24906646"/>
+              <a:ext cx="1371600" cy="1371600"/>
+            </a:xfrm>
+            <a:custGeom>
+              <a:avLst/>
+              <a:gdLst/>
+              <a:ahLst/>
+              <a:cxnLst/>
+              <a:rect l="l" t="t" r="r" b="b"/>
+              <a:pathLst>
+                <a:path w="6350000" h="6350000">
+                  <a:moveTo>
+                    <a:pt x="3175000" y="0"/>
+                  </a:moveTo>
+                  <a:cubicBezTo>
+                    <a:pt x="1421496" y="0"/>
+                    <a:pt x="0" y="1421496"/>
+                    <a:pt x="0" y="3175000"/>
+                  </a:cubicBezTo>
+                  <a:cubicBezTo>
+                    <a:pt x="0" y="4928504"/>
+                    <a:pt x="1421496" y="6350000"/>
+                    <a:pt x="3175000" y="6350000"/>
+                  </a:cubicBezTo>
+                  <a:cubicBezTo>
+                    <a:pt x="4928504" y="6350000"/>
+                    <a:pt x="6350000" y="4928504"/>
+                    <a:pt x="6350000" y="3175000"/>
+                  </a:cubicBezTo>
+                  <a:cubicBezTo>
+                    <a:pt x="6350000" y="1421496"/>
+                    <a:pt x="4928504" y="0"/>
+                    <a:pt x="3175000" y="0"/>
+                  </a:cubicBezTo>
+                  <a:close/>
+                </a:path>
+              </a:pathLst>
+            </a:custGeom>
+            <a:gradFill flip="none" rotWithShape="1">
+              <a:gsLst>
+                <a:gs pos="0">
+                  <a:schemeClr val="accent5">
+                    <a:lumMod val="0"/>
+                    <a:lumOff val="100000"/>
+                  </a:schemeClr>
+                </a:gs>
+                <a:gs pos="35000">
+                  <a:schemeClr val="accent5">
+                    <a:lumMod val="0"/>
+                    <a:lumOff val="100000"/>
+                  </a:schemeClr>
+                </a:gs>
+                <a:gs pos="100000">
+                  <a:schemeClr val="accent5">
+                    <a:lumMod val="100000"/>
+                  </a:schemeClr>
+                </a:gs>
+              </a:gsLst>
+              <a:path path="circle">
+                <a:fillToRect l="50000" t="-80000" r="50000" b="180000"/>
+              </a:path>
+              <a:tileRect/>
+            </a:gradFill>
+          </p:spPr>
+          <p:txBody>
+            <a:bodyPr/>
+            <a:lstStyle/>
+            <a:p>
+              <a:endParaRPr lang="en-US" dirty="0"/>
+            </a:p>
+          </p:txBody>
+        </p:sp>
+        <p:sp>
+          <p:nvSpPr>
+            <p:cNvPr id="45" name="Freeform 19">
+              <a:extLst>
+                <a:ext uri="{FF2B5EF4-FFF2-40B4-BE49-F238E27FC236}">
+                  <a16:creationId xmlns:a16="http://schemas.microsoft.com/office/drawing/2014/main" id="{DA5C8CE9-BCDA-5825-59C2-5A42CAAE9EE8}"/>
+                </a:ext>
+              </a:extLst>
+            </p:cNvPr>
+            <p:cNvSpPr/>
+            <p:nvPr/>
+          </p:nvSpPr>
+          <p:spPr>
+            <a:xfrm>
+              <a:off x="29398962" y="25134790"/>
+              <a:ext cx="914400" cy="914400"/>
+            </a:xfrm>
+            <a:custGeom>
+              <a:avLst/>
+              <a:gdLst/>
+              <a:ahLst/>
+              <a:cxnLst/>
+              <a:rect l="l" t="t" r="r" b="b"/>
+              <a:pathLst>
+                <a:path w="6350000" h="6350000">
+                  <a:moveTo>
+                    <a:pt x="3175000" y="0"/>
+                  </a:moveTo>
+                  <a:cubicBezTo>
+                    <a:pt x="1421496" y="0"/>
+                    <a:pt x="0" y="1421496"/>
+                    <a:pt x="0" y="3175000"/>
+                  </a:cubicBezTo>
+                  <a:cubicBezTo>
+                    <a:pt x="0" y="4928504"/>
+                    <a:pt x="1421496" y="6350000"/>
+                    <a:pt x="3175000" y="6350000"/>
+                  </a:cubicBezTo>
+                  <a:cubicBezTo>
+                    <a:pt x="4928504" y="6350000"/>
+                    <a:pt x="6350000" y="4928504"/>
+                    <a:pt x="6350000" y="3175000"/>
+                  </a:cubicBezTo>
+                  <a:cubicBezTo>
+                    <a:pt x="6350000" y="1421496"/>
+                    <a:pt x="4928504" y="0"/>
+                    <a:pt x="3175000" y="0"/>
+                  </a:cubicBezTo>
+                  <a:close/>
+                </a:path>
+              </a:pathLst>
+            </a:custGeom>
+            <a:solidFill>
+              <a:srgbClr val="FFFFFF"/>
+            </a:solidFill>
+          </p:spPr>
+          <p:txBody>
+            <a:bodyPr/>
+            <a:lstStyle/>
+            <a:p>
+              <a:endParaRPr lang="en-US" dirty="0"/>
+            </a:p>
+          </p:txBody>
+        </p:sp>
+        <p:sp>
+          <p:nvSpPr>
+            <p:cNvPr id="46" name="Freeform 31">
+              <a:extLst>
+                <a:ext uri="{FF2B5EF4-FFF2-40B4-BE49-F238E27FC236}">
+                  <a16:creationId xmlns:a16="http://schemas.microsoft.com/office/drawing/2014/main" id="{7D2FFEDC-1D13-B4CA-C9FD-B57EAED21183}"/>
+                </a:ext>
+              </a:extLst>
+            </p:cNvPr>
+            <p:cNvSpPr>
+              <a:spLocks noChangeAspect="1"/>
+            </p:cNvSpPr>
+            <p:nvPr/>
+          </p:nvSpPr>
+          <p:spPr>
+            <a:xfrm>
+              <a:off x="27493580" y="23190143"/>
+              <a:ext cx="685800" cy="685800"/>
+            </a:xfrm>
+            <a:custGeom>
+              <a:avLst/>
+              <a:gdLst/>
+              <a:ahLst/>
+              <a:cxnLst/>
+              <a:rect l="l" t="t" r="r" b="b"/>
+              <a:pathLst>
+                <a:path w="349614" h="349614">
+                  <a:moveTo>
+                    <a:pt x="0" y="0"/>
+                  </a:moveTo>
+                  <a:lnTo>
+                    <a:pt x="349614" y="0"/>
+                  </a:lnTo>
+                  <a:lnTo>
+                    <a:pt x="349614" y="349614"/>
+                  </a:lnTo>
+                  <a:lnTo>
+                    <a:pt x="0" y="349614"/>
+                  </a:lnTo>
+                  <a:lnTo>
+                    <a:pt x="0" y="0"/>
+                  </a:lnTo>
+                  <a:close/>
+                </a:path>
+              </a:pathLst>
+            </a:custGeom>
+            <a:blipFill>
+              <a:blip r:embed="rId14">
+                <a:extLst>
+                  <a:ext uri="{96DAC541-7B7A-43D3-8B79-37D633B846F1}">
+                    <asvg:svgBlip xmlns:asvg="http://schemas.microsoft.com/office/drawing/2016/SVG/main" r:embed="rId15"/>
+                  </a:ext>
+                </a:extLst>
+              </a:blip>
+              <a:stretch>
+                <a:fillRect/>
+              </a:stretch>
+            </a:blipFill>
+          </p:spPr>
+          <p:txBody>
+            <a:bodyPr/>
+            <a:lstStyle/>
+            <a:p>
+              <a:endParaRPr lang="en-US" dirty="0"/>
+            </a:p>
+          </p:txBody>
+        </p:sp>
+        <p:sp>
+          <p:nvSpPr>
+            <p:cNvPr id="47" name="Freeform 30">
+              <a:extLst>
+                <a:ext uri="{FF2B5EF4-FFF2-40B4-BE49-F238E27FC236}">
+                  <a16:creationId xmlns:a16="http://schemas.microsoft.com/office/drawing/2014/main" id="{B04973DB-4C60-0B80-CD48-46F23DF2F1B4}"/>
+                </a:ext>
+              </a:extLst>
+            </p:cNvPr>
+            <p:cNvSpPr>
+              <a:spLocks noChangeAspect="1"/>
+            </p:cNvSpPr>
+            <p:nvPr/>
+          </p:nvSpPr>
+          <p:spPr>
+            <a:xfrm>
+              <a:off x="25519618" y="21239094"/>
+              <a:ext cx="594360" cy="463600"/>
+            </a:xfrm>
+            <a:custGeom>
+              <a:avLst/>
+              <a:gdLst/>
+              <a:ahLst/>
+              <a:cxnLst/>
+              <a:rect l="l" t="t" r="r" b="b"/>
+              <a:pathLst>
+                <a:path w="328402" h="256153">
+                  <a:moveTo>
+                    <a:pt x="0" y="0"/>
+                  </a:moveTo>
+                  <a:lnTo>
+                    <a:pt x="328402" y="0"/>
+                  </a:lnTo>
+                  <a:lnTo>
+                    <a:pt x="328402" y="256154"/>
+                  </a:lnTo>
+                  <a:lnTo>
+                    <a:pt x="0" y="256154"/>
+                  </a:lnTo>
+                  <a:lnTo>
+                    <a:pt x="0" y="0"/>
+                  </a:lnTo>
+                  <a:close/>
+                </a:path>
+              </a:pathLst>
+            </a:custGeom>
+            <a:blipFill>
+              <a:blip r:embed="rId16">
+                <a:extLst>
+                  <a:ext uri="{96DAC541-7B7A-43D3-8B79-37D633B846F1}">
+                    <asvg:svgBlip xmlns:asvg="http://schemas.microsoft.com/office/drawing/2016/SVG/main" r:embed="rId17"/>
+                  </a:ext>
+                </a:extLst>
+              </a:blip>
+              <a:stretch>
+                <a:fillRect/>
+              </a:stretch>
+            </a:blipFill>
+          </p:spPr>
+          <p:txBody>
+            <a:bodyPr/>
+            <a:lstStyle/>
+            <a:p>
+              <a:endParaRPr lang="en-US" dirty="0"/>
+            </a:p>
+          </p:txBody>
+        </p:sp>
+        <p:sp>
+          <p:nvSpPr>
+            <p:cNvPr id="48" name="Freeform 32">
+              <a:extLst>
+                <a:ext uri="{FF2B5EF4-FFF2-40B4-BE49-F238E27FC236}">
+                  <a16:creationId xmlns:a16="http://schemas.microsoft.com/office/drawing/2014/main" id="{034FB8FE-BA7F-63A6-EDE0-08441C61634C}"/>
+                </a:ext>
+              </a:extLst>
+            </p:cNvPr>
+            <p:cNvSpPr>
+              <a:spLocks noChangeAspect="1"/>
+            </p:cNvSpPr>
+            <p:nvPr/>
+          </p:nvSpPr>
+          <p:spPr>
+            <a:xfrm>
+              <a:off x="29558982" y="25319696"/>
+              <a:ext cx="594360" cy="542488"/>
+            </a:xfrm>
+            <a:custGeom>
+              <a:avLst/>
+              <a:gdLst/>
+              <a:ahLst/>
+              <a:cxnLst/>
+              <a:rect l="l" t="t" r="r" b="b"/>
+              <a:pathLst>
+                <a:path w="341881" h="312044">
+                  <a:moveTo>
+                    <a:pt x="0" y="0"/>
+                  </a:moveTo>
+                  <a:lnTo>
+                    <a:pt x="341882" y="0"/>
+                  </a:lnTo>
+                  <a:lnTo>
+                    <a:pt x="341882" y="312044"/>
+                  </a:lnTo>
+                  <a:lnTo>
+                    <a:pt x="0" y="312044"/>
+                  </a:lnTo>
+                  <a:lnTo>
+                    <a:pt x="0" y="0"/>
+                  </a:lnTo>
+                  <a:close/>
+                </a:path>
+              </a:pathLst>
+            </a:custGeom>
+            <a:blipFill>
+              <a:blip r:embed="rId18">
+                <a:extLst>
+                  <a:ext uri="{96DAC541-7B7A-43D3-8B79-37D633B846F1}">
+                    <asvg:svgBlip xmlns:asvg="http://schemas.microsoft.com/office/drawing/2016/SVG/main" r:embed="rId19"/>
+                  </a:ext>
+                </a:extLst>
+              </a:blip>
+              <a:stretch>
+                <a:fillRect/>
+              </a:stretch>
+            </a:blipFill>
+          </p:spPr>
+          <p:txBody>
+            <a:bodyPr/>
+            <a:lstStyle/>
+            <a:p>
+              <a:endParaRPr lang="en-US"/>
+            </a:p>
+          </p:txBody>
+        </p:sp>
+        <p:sp>
+          <p:nvSpPr>
+            <p:cNvPr id="50" name="Freeform 3">
+              <a:extLst>
+                <a:ext uri="{FF2B5EF4-FFF2-40B4-BE49-F238E27FC236}">
+                  <a16:creationId xmlns:a16="http://schemas.microsoft.com/office/drawing/2014/main" id="{540C618B-DC44-3237-DF62-192008FA0710}"/>
+                </a:ext>
+              </a:extLst>
+            </p:cNvPr>
+            <p:cNvSpPr/>
+            <p:nvPr/>
+          </p:nvSpPr>
+          <p:spPr>
+            <a:xfrm>
+              <a:off x="16481916" y="19410987"/>
+              <a:ext cx="7315200" cy="1828800"/>
+            </a:xfrm>
+            <a:custGeom>
+              <a:avLst/>
+              <a:gdLst/>
+              <a:ahLst/>
+              <a:cxnLst/>
+              <a:rect l="l" t="t" r="r" b="b"/>
+              <a:pathLst>
+                <a:path w="8950884" h="2311400">
+                  <a:moveTo>
+                    <a:pt x="8646084" y="0"/>
+                  </a:moveTo>
+                  <a:lnTo>
+                    <a:pt x="304800" y="0"/>
+                  </a:lnTo>
+                  <a:cubicBezTo>
+                    <a:pt x="135890" y="0"/>
+                    <a:pt x="0" y="135890"/>
+                    <a:pt x="0" y="304800"/>
+                  </a:cubicBezTo>
+                  <a:lnTo>
+                    <a:pt x="0" y="2006600"/>
+                  </a:lnTo>
+                  <a:cubicBezTo>
+                    <a:pt x="0" y="2175510"/>
+                    <a:pt x="135890" y="2311400"/>
+                    <a:pt x="304800" y="2311400"/>
+                  </a:cubicBezTo>
+                  <a:lnTo>
+                    <a:pt x="8646084" y="2311400"/>
+                  </a:lnTo>
+                  <a:cubicBezTo>
+                    <a:pt x="8814994" y="2311400"/>
+                    <a:pt x="8950884" y="2175510"/>
+                    <a:pt x="8950884" y="2006600"/>
+                  </a:cubicBezTo>
+                  <a:lnTo>
+                    <a:pt x="8950884" y="304800"/>
+                  </a:lnTo>
+                  <a:cubicBezTo>
+                    <a:pt x="8950884" y="135890"/>
+                    <a:pt x="8814994" y="0"/>
+                    <a:pt x="8646084" y="0"/>
+                  </a:cubicBezTo>
+                  <a:close/>
+                </a:path>
+              </a:pathLst>
+            </a:custGeom>
+            <a:gradFill>
+              <a:gsLst>
+                <a:gs pos="0">
+                  <a:schemeClr val="accent2">
+                    <a:lumMod val="1000"/>
+                    <a:lumOff val="99000"/>
+                  </a:schemeClr>
+                </a:gs>
+                <a:gs pos="74000">
+                  <a:schemeClr val="accent2">
+                    <a:lumMod val="45000"/>
+                    <a:lumOff val="55000"/>
+                  </a:schemeClr>
+                </a:gs>
+                <a:gs pos="83000">
+                  <a:schemeClr val="accent2">
+                    <a:lumMod val="45000"/>
+                    <a:lumOff val="55000"/>
+                  </a:schemeClr>
+                </a:gs>
+                <a:gs pos="100000">
+                  <a:schemeClr val="accent2">
+                    <a:lumMod val="30000"/>
+                    <a:lumOff val="70000"/>
+                  </a:schemeClr>
+                </a:gs>
+              </a:gsLst>
+              <a:lin ang="5400000" scaled="1"/>
+            </a:gradFill>
+            <a:ln w="9525">
+              <a:solidFill>
+                <a:schemeClr val="tx1"/>
+              </a:solidFill>
+            </a:ln>
+          </p:spPr>
+          <p:style>
+            <a:lnRef idx="1">
+              <a:schemeClr val="accent2"/>
+            </a:lnRef>
+            <a:fillRef idx="2">
+              <a:schemeClr val="accent2"/>
+            </a:fillRef>
+            <a:effectRef idx="1">
+              <a:schemeClr val="accent2"/>
+            </a:effectRef>
+            <a:fontRef idx="minor">
+              <a:schemeClr val="dk1"/>
+            </a:fontRef>
+          </p:style>
+          <p:txBody>
+            <a:bodyPr lIns="228600" tIns="182880" rIns="228600" bIns="182880" anchor="ctr" anchorCtr="0"/>
+            <a:lstStyle/>
+            <a:p>
+              <a:r>
+                <a:rPr lang="en-US" sz="2800" b="1" dirty="0">
+                  <a:latin typeface="Arial" panose="020B0604020202020204" pitchFamily="34" charset="0"/>
+                  <a:cs typeface="Arial" panose="020B0604020202020204" pitchFamily="34" charset="0"/>
+                </a:rPr>
+                <a:t>Data Collection and Processing</a:t>
+              </a:r>
+            </a:p>
+            <a:p>
+              <a:pPr marL="342900" indent="-342900">
+                <a:buFont typeface="Arial" panose="020B0604020202020204" pitchFamily="34" charset="0"/>
+                <a:buChar char="•"/>
+              </a:pPr>
+              <a:r>
+                <a:rPr lang="en-US" sz="2000" dirty="0">
+                  <a:latin typeface="Arial" panose="020B0604020202020204" pitchFamily="34" charset="0"/>
+                  <a:cs typeface="Arial" panose="020B0604020202020204" pitchFamily="34" charset="0"/>
+                </a:rPr>
+                <a:t>RealSense D455 captures depth and RGB data</a:t>
+              </a:r>
+            </a:p>
+            <a:p>
+              <a:pPr marL="342900" indent="-342900">
+                <a:buFont typeface="Arial" panose="020B0604020202020204" pitchFamily="34" charset="0"/>
+                <a:buChar char="•"/>
+              </a:pPr>
+              <a:r>
+                <a:rPr lang="en-US" sz="2000" dirty="0">
+                  <a:latin typeface="Arial" panose="020B0604020202020204" pitchFamily="34" charset="0"/>
+                  <a:cs typeface="Arial" panose="020B0604020202020204" pitchFamily="34" charset="0"/>
+                </a:rPr>
+                <a:t>OpenCV processes spatial information in real-time</a:t>
+              </a:r>
+            </a:p>
+            <a:p>
+              <a:pPr marL="342900" indent="-342900">
+                <a:buFont typeface="Arial" panose="020B0604020202020204" pitchFamily="34" charset="0"/>
+                <a:buChar char="•"/>
+              </a:pPr>
+              <a:r>
+                <a:rPr lang="en-US" sz="2000" dirty="0">
+                  <a:latin typeface="Arial" panose="020B0604020202020204" pitchFamily="34" charset="0"/>
+                  <a:cs typeface="Arial" panose="020B0604020202020204" pitchFamily="34" charset="0"/>
+                </a:rPr>
+                <a:t>Advanced object and human detection algorithms</a:t>
+              </a:r>
+            </a:p>
+          </p:txBody>
+        </p:sp>
+        <p:sp>
+          <p:nvSpPr>
+            <p:cNvPr id="51" name="Freeform 11">
+              <a:extLst>
+                <a:ext uri="{FF2B5EF4-FFF2-40B4-BE49-F238E27FC236}">
+                  <a16:creationId xmlns:a16="http://schemas.microsoft.com/office/drawing/2014/main" id="{D2918351-750D-781E-CF14-FDE18FA113C5}"/>
+                </a:ext>
+              </a:extLst>
+            </p:cNvPr>
+            <p:cNvSpPr/>
+            <p:nvPr/>
+          </p:nvSpPr>
+          <p:spPr>
+            <a:xfrm>
+              <a:off x="23111316" y="18726693"/>
+              <a:ext cx="1371600" cy="1371600"/>
+            </a:xfrm>
+            <a:custGeom>
+              <a:avLst/>
+              <a:gdLst/>
+              <a:ahLst/>
+              <a:cxnLst/>
+              <a:rect l="l" t="t" r="r" b="b"/>
+              <a:pathLst>
+                <a:path w="6350000" h="6350000">
+                  <a:moveTo>
+                    <a:pt x="3175000" y="0"/>
+                  </a:moveTo>
+                  <a:cubicBezTo>
+                    <a:pt x="1421496" y="0"/>
+                    <a:pt x="0" y="1421496"/>
+                    <a:pt x="0" y="3175000"/>
+                  </a:cubicBezTo>
+                  <a:cubicBezTo>
+                    <a:pt x="0" y="4928504"/>
+                    <a:pt x="1421496" y="6350000"/>
+                    <a:pt x="3175000" y="6350000"/>
+                  </a:cubicBezTo>
+                  <a:cubicBezTo>
+                    <a:pt x="4928504" y="6350000"/>
+                    <a:pt x="6350000" y="4928504"/>
+                    <a:pt x="6350000" y="3175000"/>
+                  </a:cubicBezTo>
+                  <a:cubicBezTo>
+                    <a:pt x="6350000" y="1421496"/>
+                    <a:pt x="4928504" y="0"/>
+                    <a:pt x="3175000" y="0"/>
+                  </a:cubicBezTo>
+                  <a:close/>
+                </a:path>
+              </a:pathLst>
+            </a:custGeom>
+            <a:gradFill flip="none" rotWithShape="1">
+              <a:gsLst>
+                <a:gs pos="0">
+                  <a:schemeClr val="accent2">
+                    <a:lumMod val="0"/>
+                    <a:lumOff val="100000"/>
+                  </a:schemeClr>
+                </a:gs>
+                <a:gs pos="35000">
+                  <a:schemeClr val="accent2">
+                    <a:lumMod val="0"/>
+                    <a:lumOff val="100000"/>
+                  </a:schemeClr>
+                </a:gs>
+                <a:gs pos="100000">
+                  <a:schemeClr val="accent2">
+                    <a:lumMod val="100000"/>
+                  </a:schemeClr>
+                </a:gs>
+              </a:gsLst>
+              <a:path path="circle">
+                <a:fillToRect l="50000" t="-80000" r="50000" b="180000"/>
+              </a:path>
+              <a:tileRect/>
+            </a:gradFill>
+          </p:spPr>
+          <p:txBody>
+            <a:bodyPr/>
+            <a:lstStyle/>
+            <a:p>
+              <a:endParaRPr lang="en-US" dirty="0"/>
+            </a:p>
+          </p:txBody>
+        </p:sp>
+        <p:sp>
+          <p:nvSpPr>
+            <p:cNvPr id="52" name="Freeform 19">
+              <a:extLst>
+                <a:ext uri="{FF2B5EF4-FFF2-40B4-BE49-F238E27FC236}">
+                  <a16:creationId xmlns:a16="http://schemas.microsoft.com/office/drawing/2014/main" id="{59F1985F-88BD-DBB0-C094-16583BD9C9C8}"/>
+                </a:ext>
+              </a:extLst>
+            </p:cNvPr>
+            <p:cNvSpPr/>
+            <p:nvPr/>
+          </p:nvSpPr>
+          <p:spPr>
+            <a:xfrm>
+              <a:off x="23339916" y="18954837"/>
+              <a:ext cx="914400" cy="914400"/>
+            </a:xfrm>
+            <a:custGeom>
+              <a:avLst/>
+              <a:gdLst/>
+              <a:ahLst/>
+              <a:cxnLst/>
+              <a:rect l="l" t="t" r="r" b="b"/>
+              <a:pathLst>
+                <a:path w="6350000" h="6350000">
+                  <a:moveTo>
+                    <a:pt x="3175000" y="0"/>
+                  </a:moveTo>
+                  <a:cubicBezTo>
+                    <a:pt x="1421496" y="0"/>
+                    <a:pt x="0" y="1421496"/>
+                    <a:pt x="0" y="3175000"/>
+                  </a:cubicBezTo>
+                  <a:cubicBezTo>
+                    <a:pt x="0" y="4928504"/>
+                    <a:pt x="1421496" y="6350000"/>
+                    <a:pt x="3175000" y="6350000"/>
+                  </a:cubicBezTo>
+                  <a:cubicBezTo>
+                    <a:pt x="4928504" y="6350000"/>
+                    <a:pt x="6350000" y="4928504"/>
+                    <a:pt x="6350000" y="3175000"/>
+                  </a:cubicBezTo>
+                  <a:cubicBezTo>
+                    <a:pt x="6350000" y="1421496"/>
+                    <a:pt x="4928504" y="0"/>
+                    <a:pt x="3175000" y="0"/>
+                  </a:cubicBezTo>
+                  <a:close/>
+                </a:path>
+              </a:pathLst>
+            </a:custGeom>
+            <a:solidFill>
+              <a:srgbClr val="FFFFFF"/>
+            </a:solidFill>
+          </p:spPr>
+          <p:txBody>
+            <a:bodyPr/>
+            <a:lstStyle/>
+            <a:p>
+              <a:endParaRPr lang="en-US" dirty="0"/>
+            </a:p>
+          </p:txBody>
+        </p:sp>
+        <p:sp>
+          <p:nvSpPr>
+            <p:cNvPr id="53" name="Freeform 29">
+              <a:extLst>
+                <a:ext uri="{FF2B5EF4-FFF2-40B4-BE49-F238E27FC236}">
+                  <a16:creationId xmlns:a16="http://schemas.microsoft.com/office/drawing/2014/main" id="{6F57AE17-D554-927A-50DE-29F54511C830}"/>
+                </a:ext>
+              </a:extLst>
+            </p:cNvPr>
+            <p:cNvSpPr>
+              <a:spLocks noChangeAspect="1"/>
+            </p:cNvSpPr>
+            <p:nvPr/>
+          </p:nvSpPr>
+          <p:spPr>
+            <a:xfrm>
+              <a:off x="23647988" y="19071204"/>
+              <a:ext cx="317183" cy="685800"/>
+            </a:xfrm>
+            <a:custGeom>
+              <a:avLst/>
+              <a:gdLst/>
+              <a:ahLst/>
+              <a:cxnLst/>
+              <a:rect l="l" t="t" r="r" b="b"/>
+              <a:pathLst>
+                <a:path w="176831" h="382337">
+                  <a:moveTo>
+                    <a:pt x="0" y="0"/>
+                  </a:moveTo>
+                  <a:lnTo>
+                    <a:pt x="176830" y="0"/>
+                  </a:lnTo>
+                  <a:lnTo>
+                    <a:pt x="176830" y="382337"/>
+                  </a:lnTo>
+                  <a:lnTo>
+                    <a:pt x="0" y="382337"/>
+                  </a:lnTo>
+                  <a:lnTo>
+                    <a:pt x="0" y="0"/>
+                  </a:lnTo>
+                  <a:close/>
+                </a:path>
+              </a:pathLst>
+            </a:custGeom>
+            <a:blipFill>
+              <a:blip r:embed="rId20">
+                <a:extLst>
+                  <a:ext uri="{96DAC541-7B7A-43D3-8B79-37D633B846F1}">
+                    <asvg:svgBlip xmlns:asvg="http://schemas.microsoft.com/office/drawing/2016/SVG/main" r:embed="rId21"/>
+                  </a:ext>
+                </a:extLst>
+              </a:blip>
+              <a:stretch>
+                <a:fillRect/>
+              </a:stretch>
+            </a:blipFill>
+          </p:spPr>
+          <p:txBody>
+            <a:bodyPr/>
+            <a:lstStyle/>
+            <a:p>
+              <a:endParaRPr lang="en-US" dirty="0"/>
+            </a:p>
+          </p:txBody>
+        </p:sp>
+      </p:grpSp>
+      <p:pic>
+        <p:nvPicPr>
+          <p:cNvPr id="1034" name="Picture 10" descr="Nvidia Logo - PNG y Vector">
+            <a:extLst>
+              <a:ext uri="{FF2B5EF4-FFF2-40B4-BE49-F238E27FC236}">
+                <a16:creationId xmlns:a16="http://schemas.microsoft.com/office/drawing/2014/main" id="{83B7F37D-931E-DF97-C9E8-FFA8D855175B}"/>
+              </a:ext>
+            </a:extLst>
+          </p:cNvPr>
+          <p:cNvPicPr>
+            <a:picLocks noChangeAspect="1" noChangeArrowheads="1"/>
+          </p:cNvPicPr>
+          <p:nvPr/>
+        </p:nvPicPr>
+        <p:blipFill rotWithShape="1">
+          <a:blip r:embed="rId22">
+            <a:extLst>
+              <a:ext uri="{28A0092B-C50C-407E-A947-70E740481C1C}">
+                <a14:useLocalDpi xmlns:a14="http://schemas.microsoft.com/office/drawing/2010/main" val="0"/>
+              </a:ext>
+            </a:extLst>
+          </a:blip>
+          <a:srcRect l="17037" t="21156" r="28573" b="41190"/>
+          <a:stretch/>
+        </p:blipFill>
+        <p:spPr bwMode="auto">
+          <a:xfrm>
+            <a:off x="25826243" y="18936196"/>
+            <a:ext cx="2641717" cy="1828800"/>
+          </a:xfrm>
+          <a:prstGeom prst="rect">
+            <a:avLst/>
+          </a:prstGeom>
+          <a:noFill/>
+          <a:effectLst>
+            <a:outerShdw blurRad="76200" dir="13500000" sy="23000" kx="1200000" algn="br" rotWithShape="0">
+              <a:prstClr val="black">
+                <a:alpha val="20000"/>
+              </a:prstClr>
+            </a:outerShdw>
+          </a:effectLst>
+          <a:extLst>
+            <a:ext uri="{909E8E84-426E-40DD-AFC4-6F175D3DCCD1}">
+              <a14:hiddenFill xmlns:a14="http://schemas.microsoft.com/office/drawing/2010/main">
+                <a:solidFill>
+                  <a:srgbClr val="FFFFFF"/>
+                </a:solidFill>
+              </a14:hiddenFill>
+            </a:ext>
+          </a:extLst>
+        </p:spPr>
+      </p:pic>
+      <p:sp>
+        <p:nvSpPr>
+          <p:cNvPr id="22" name="TextBox 21">
+            <a:extLst>
+              <a:ext uri="{FF2B5EF4-FFF2-40B4-BE49-F238E27FC236}">
+                <a16:creationId xmlns:a16="http://schemas.microsoft.com/office/drawing/2014/main" id="{2609F6B6-7BCB-350C-0B81-7EAFAF6EE15C}"/>
+              </a:ext>
+            </a:extLst>
+          </p:cNvPr>
+          <p:cNvSpPr txBox="1"/>
+          <p:nvPr/>
+        </p:nvSpPr>
+        <p:spPr>
+          <a:xfrm>
+            <a:off x="25576978" y="20785792"/>
+            <a:ext cx="3140245" cy="707886"/>
+          </a:xfrm>
+          <a:prstGeom prst="rect">
+            <a:avLst/>
+          </a:prstGeom>
+          <a:noFill/>
+        </p:spPr>
+        <p:txBody>
+          <a:bodyPr wrap="square" rtlCol="0">
+            <a:spAutoFit/>
+          </a:bodyPr>
+          <a:lstStyle/>
+          <a:p>
+            <a:pPr algn="ctr"/>
+            <a:r>
+              <a:rPr lang="en-US" sz="4000" b="1" dirty="0">
+                <a:latin typeface="Arial" panose="020B0604020202020204" pitchFamily="34" charset="0"/>
+                <a:cs typeface="Arial" panose="020B0604020202020204" pitchFamily="34" charset="0"/>
+              </a:rPr>
+              <a:t>Isaac Sim</a:t>
+            </a:r>
+          </a:p>
+        </p:txBody>
+      </p:sp>
+      <p:pic>
+        <p:nvPicPr>
+          <p:cNvPr id="3" name="Picture 2" descr="OpenCV: Que es OpenCV">
+            <a:extLst>
+              <a:ext uri="{FF2B5EF4-FFF2-40B4-BE49-F238E27FC236}">
+                <a16:creationId xmlns:a16="http://schemas.microsoft.com/office/drawing/2014/main" id="{B4581CC9-ECF6-DBBA-7F79-DC9CDE7F5BD0}"/>
+              </a:ext>
+            </a:extLst>
+          </p:cNvPr>
+          <p:cNvPicPr>
+            <a:picLocks noChangeAspect="1" noChangeArrowheads="1"/>
+          </p:cNvPicPr>
+          <p:nvPr/>
+        </p:nvPicPr>
+        <p:blipFill rotWithShape="1">
+          <a:blip r:embed="rId23">
+            <a:extLst>
+              <a:ext uri="{28A0092B-C50C-407E-A947-70E740481C1C}">
+                <a14:useLocalDpi xmlns:a14="http://schemas.microsoft.com/office/drawing/2010/main" val="0"/>
+              </a:ext>
+            </a:extLst>
+          </a:blip>
+          <a:srcRect b="24392"/>
+          <a:stretch/>
+        </p:blipFill>
+        <p:spPr bwMode="auto">
+          <a:xfrm>
+            <a:off x="29282080" y="18936196"/>
+            <a:ext cx="1962246" cy="1828800"/>
+          </a:xfrm>
+          <a:prstGeom prst="rect">
+            <a:avLst/>
+          </a:prstGeom>
+          <a:noFill/>
+          <a:effectLst>
+            <a:outerShdw blurRad="76200" dir="13500000" sy="23000" kx="1200000" algn="br" rotWithShape="0">
+              <a:prstClr val="black">
+                <a:alpha val="20000"/>
+              </a:prstClr>
+            </a:outerShdw>
+          </a:effectLst>
+          <a:extLst>
+            <a:ext uri="{909E8E84-426E-40DD-AFC4-6F175D3DCCD1}">
+              <a14:hiddenFill xmlns:a14="http://schemas.microsoft.com/office/drawing/2010/main">
+                <a:solidFill>
+                  <a:srgbClr val="FFFFFF"/>
+                </a:solidFill>
+              </a14:hiddenFill>
+            </a:ext>
+          </a:extLst>
+        </p:spPr>
+      </p:pic>
+      <p:sp>
+        <p:nvSpPr>
+          <p:cNvPr id="17" name="TextBox 16">
+            <a:extLst>
+              <a:ext uri="{FF2B5EF4-FFF2-40B4-BE49-F238E27FC236}">
+                <a16:creationId xmlns:a16="http://schemas.microsoft.com/office/drawing/2014/main" id="{7AF09225-D0F8-3619-4957-A4D1088566D1}"/>
+              </a:ext>
+            </a:extLst>
+          </p:cNvPr>
+          <p:cNvSpPr txBox="1"/>
+          <p:nvPr/>
+        </p:nvSpPr>
+        <p:spPr>
+          <a:xfrm>
+            <a:off x="28357745" y="20785792"/>
+            <a:ext cx="3810916" cy="707886"/>
+          </a:xfrm>
+          <a:prstGeom prst="rect">
+            <a:avLst/>
+          </a:prstGeom>
+          <a:noFill/>
+        </p:spPr>
+        <p:txBody>
+          <a:bodyPr wrap="square" rtlCol="0">
+            <a:spAutoFit/>
+          </a:bodyPr>
+          <a:lstStyle/>
+          <a:p>
+            <a:pPr algn="ctr"/>
+            <a:r>
+              <a:rPr lang="en-US" sz="4000" b="1" dirty="0">
+                <a:latin typeface="Arial" panose="020B0604020202020204" pitchFamily="34" charset="0"/>
+                <a:cs typeface="Arial" panose="020B0604020202020204" pitchFamily="34" charset="0"/>
+              </a:rPr>
+              <a:t>OpenCV</a:t>
+            </a:r>
+          </a:p>
+        </p:txBody>
+      </p:sp>
+      <p:pic>
+        <p:nvPicPr>
+          <p:cNvPr id="1056" name="Picture 5" descr="Intel Logo PNG Image - PurePNG | Free transparent CC0 PNG Image Library">
+            <a:extLst>
+              <a:ext uri="{FF2B5EF4-FFF2-40B4-BE49-F238E27FC236}">
+                <a16:creationId xmlns:a16="http://schemas.microsoft.com/office/drawing/2014/main" id="{FB50A7B5-0E5B-4888-F8A9-CEB6AF101335}"/>
+              </a:ext>
+            </a:extLst>
+          </p:cNvPr>
+          <p:cNvPicPr>
+            <a:picLocks noChangeAspect="1" noChangeArrowheads="1"/>
+          </p:cNvPicPr>
+          <p:nvPr/>
+        </p:nvPicPr>
+        <p:blipFill>
+          <a:blip r:embed="rId24">
+            <a:extLst>
+              <a:ext uri="{28A0092B-C50C-407E-A947-70E740481C1C}">
+                <a14:useLocalDpi xmlns:a14="http://schemas.microsoft.com/office/drawing/2010/main" val="0"/>
+              </a:ext>
+            </a:extLst>
+          </a:blip>
+          <a:srcRect/>
+          <a:stretch>
+            <a:fillRect/>
+          </a:stretch>
+        </p:blipFill>
+        <p:spPr bwMode="auto">
+          <a:xfrm>
+            <a:off x="22277630" y="18956992"/>
+            <a:ext cx="2743200" cy="1828800"/>
+          </a:xfrm>
+          <a:prstGeom prst="rect">
+            <a:avLst/>
+          </a:prstGeom>
+          <a:noFill/>
+          <a:extLst>
+            <a:ext uri="{909E8E84-426E-40DD-AFC4-6F175D3DCCD1}">
+              <a14:hiddenFill xmlns:a14="http://schemas.microsoft.com/office/drawing/2010/main">
+                <a:solidFill>
+                  <a:srgbClr val="FFFFFF"/>
+                </a:solidFill>
+              </a14:hiddenFill>
+            </a:ext>
+          </a:extLst>
+        </p:spPr>
+      </p:pic>
+      <p:sp>
+        <p:nvSpPr>
+          <p:cNvPr id="1057" name="TextBox 1056">
+            <a:extLst>
+              <a:ext uri="{FF2B5EF4-FFF2-40B4-BE49-F238E27FC236}">
+                <a16:creationId xmlns:a16="http://schemas.microsoft.com/office/drawing/2014/main" id="{79E92B52-4824-8452-37E8-AF703DAA3000}"/>
+              </a:ext>
+            </a:extLst>
+          </p:cNvPr>
+          <p:cNvSpPr txBox="1"/>
+          <p:nvPr/>
+        </p:nvSpPr>
+        <p:spPr>
+          <a:xfrm>
+            <a:off x="21996920" y="20791663"/>
+            <a:ext cx="3304620" cy="707886"/>
+          </a:xfrm>
+          <a:prstGeom prst="rect">
+            <a:avLst/>
+          </a:prstGeom>
+          <a:noFill/>
+        </p:spPr>
+        <p:txBody>
+          <a:bodyPr wrap="square" rtlCol="0">
+            <a:spAutoFit/>
+          </a:bodyPr>
+          <a:lstStyle/>
+          <a:p>
+            <a:pPr algn="ctr"/>
+            <a:r>
+              <a:rPr lang="en-US" sz="4000" b="1" dirty="0">
+                <a:latin typeface="Arial" panose="020B0604020202020204" pitchFamily="34" charset="0"/>
+                <a:cs typeface="Arial" panose="020B0604020202020204" pitchFamily="34" charset="0"/>
+              </a:rPr>
+              <a:t>RealSense</a:t>
+            </a:r>
+          </a:p>
+        </p:txBody>
+      </p:sp>
+      <p:sp>
+        <p:nvSpPr>
+          <p:cNvPr id="1059" name="Rectangle: Rounded Corners 1058">
+            <a:extLst>
+              <a:ext uri="{FF2B5EF4-FFF2-40B4-BE49-F238E27FC236}">
+                <a16:creationId xmlns:a16="http://schemas.microsoft.com/office/drawing/2014/main" id="{29F310F5-8E93-575B-457F-03A36EC5664E}"/>
+              </a:ext>
+            </a:extLst>
+          </p:cNvPr>
+          <p:cNvSpPr/>
+          <p:nvPr/>
+        </p:nvSpPr>
+        <p:spPr>
+          <a:xfrm>
+            <a:off x="25962894" y="21918792"/>
+            <a:ext cx="5486400" cy="5486400"/>
+          </a:xfrm>
+          <a:prstGeom prst="roundRect">
+            <a:avLst>
+              <a:gd name="adj" fmla="val 3110"/>
+            </a:avLst>
+          </a:prstGeom>
+          <a:solidFill>
+            <a:schemeClr val="bg1"/>
+          </a:solidFill>
+        </p:spPr>
+        <p:style>
+          <a:lnRef idx="2">
+            <a:schemeClr val="accent1">
+              <a:shade val="15000"/>
+            </a:schemeClr>
+          </a:lnRef>
+          <a:fillRef idx="1">
+            <a:schemeClr val="accent1"/>
+          </a:fillRef>
+          <a:effectRef idx="0">
+            <a:schemeClr val="accent1"/>
+          </a:effectRef>
+          <a:fontRef idx="minor">
+            <a:schemeClr val="lt1"/>
+          </a:fontRef>
+        </p:style>
+        <p:txBody>
+          <a:bodyPr lIns="365760" tIns="45720" rIns="365760" rtlCol="0" anchor="ctr" anchorCtr="0"/>
+          <a:lstStyle/>
+          <a:p>
+            <a:r>
+              <a:rPr lang="en-US" sz="4000" b="1" dirty="0">
+                <a:solidFill>
+                  <a:schemeClr val="tx1"/>
+                </a:solidFill>
+                <a:latin typeface="Arial" panose="020B0604020202020204" pitchFamily="34" charset="0"/>
+                <a:cs typeface="Arial" panose="020B0604020202020204" pitchFamily="34" charset="0"/>
+              </a:rPr>
+              <a:t>What’s this?</a:t>
+            </a:r>
+          </a:p>
+          <a:p>
+            <a:r>
+              <a:rPr lang="en-US" sz="2400" dirty="0">
+                <a:solidFill>
+                  <a:schemeClr val="tx1"/>
+                </a:solidFill>
+                <a:latin typeface="Arial" panose="020B0604020202020204" pitchFamily="34" charset="0"/>
+                <a:cs typeface="Arial" panose="020B0604020202020204" pitchFamily="34" charset="0"/>
+              </a:rPr>
+              <a:t>The data flow represents a continuous learning cycle where real-world interactions are processed, virtualized, and optimized in real-time. The system learns from both robot performance metrics and human behavioral patterns, creating an ever-improving collaborative environment that maintains safety and maximizes efficiency.</a:t>
+            </a:r>
+          </a:p>
+        </p:txBody>
+      </p:sp>
     </p:spTree>
     <p:extLst>
       <p:ext uri="{BB962C8B-B14F-4D97-AF65-F5344CB8AC3E}">

</xml_diff>